<commit_message>
update power point slides
new slides added
</commit_message>
<xml_diff>
--- a/QLD Housing Vacancy.pptx
+++ b/QLD Housing Vacancy.pptx
@@ -6,21 +6,25 @@
   </p:sldMasterIdLst>
   <p:sldIdLst>
     <p:sldId id="298" r:id="rId5"/>
-    <p:sldId id="301" r:id="rId6"/>
+    <p:sldId id="315" r:id="rId6"/>
     <p:sldId id="307" r:id="rId7"/>
-    <p:sldId id="306" r:id="rId8"/>
-    <p:sldId id="313" r:id="rId9"/>
-    <p:sldId id="305" r:id="rId10"/>
-    <p:sldId id="302" r:id="rId11"/>
-    <p:sldId id="303" r:id="rId12"/>
-    <p:sldId id="314" r:id="rId13"/>
-    <p:sldId id="304" r:id="rId14"/>
-    <p:sldId id="308" r:id="rId15"/>
-    <p:sldId id="309" r:id="rId16"/>
-    <p:sldId id="310" r:id="rId17"/>
-    <p:sldId id="300" r:id="rId18"/>
-    <p:sldId id="312" r:id="rId19"/>
-    <p:sldId id="311" r:id="rId20"/>
+    <p:sldId id="301" r:id="rId8"/>
+    <p:sldId id="306" r:id="rId9"/>
+    <p:sldId id="316" r:id="rId10"/>
+    <p:sldId id="313" r:id="rId11"/>
+    <p:sldId id="319" r:id="rId12"/>
+    <p:sldId id="305" r:id="rId13"/>
+    <p:sldId id="302" r:id="rId14"/>
+    <p:sldId id="304" r:id="rId15"/>
+    <p:sldId id="308" r:id="rId16"/>
+    <p:sldId id="309" r:id="rId17"/>
+    <p:sldId id="310" r:id="rId18"/>
+    <p:sldId id="318" r:id="rId19"/>
+    <p:sldId id="317" r:id="rId20"/>
+    <p:sldId id="314" r:id="rId21"/>
+    <p:sldId id="300" r:id="rId22"/>
+    <p:sldId id="312" r:id="rId23"/>
+    <p:sldId id="311" r:id="rId24"/>
   </p:sldIdLst>
   <p:sldSz cx="12192000" cy="6858000"/>
   <p:notesSz cx="6858000" cy="9144000"/>
@@ -3585,23 +3589,23 @@
         </p:nvSpPr>
         <p:spPr>
           <a:xfrm>
-            <a:off x="8123416" y="1475234"/>
-            <a:ext cx="3214307" cy="2901694"/>
+            <a:off x="8016375" y="1472662"/>
+            <a:ext cx="3428389" cy="2901694"/>
           </a:xfrm>
         </p:spPr>
         <p:txBody>
           <a:bodyPr anchor="b">
-            <a:normAutofit/>
+            <a:noAutofit/>
           </a:bodyPr>
           <a:lstStyle/>
           <a:p>
             <a:r>
-              <a:rPr lang="en-US" sz="4400" dirty="0">
+              <a:rPr lang="en-US" sz="3600" dirty="0">
                 <a:solidFill>
                   <a:schemeClr val="tx1"/>
                 </a:solidFill>
               </a:rPr>
-              <a:t>QLD Housing Vacancy</a:t>
+              <a:t>QLD Vacancy Days Analysis in Public Housing </a:t>
             </a:r>
           </a:p>
         </p:txBody>
@@ -3630,7 +3634,7 @@
         </p:spPr>
         <p:txBody>
           <a:bodyPr anchor="t">
-            <a:normAutofit/>
+            <a:normAutofit fontScale="77500" lnSpcReduction="20000"/>
           </a:bodyPr>
           <a:lstStyle/>
           <a:p>
@@ -3641,7 +3645,18 @@
             </a:pPr>
             <a:r>
               <a:rPr lang="en-US" sz="1600" dirty="0"/>
-              <a:t>PROJECT 1 </a:t>
+              <a:t>PROJECT 1</a:t>
+            </a:r>
+          </a:p>
+          <a:p>
+            <a:pPr>
+              <a:lnSpc>
+                <a:spcPct val="100000"/>
+              </a:lnSpc>
+            </a:pPr>
+            <a:r>
+              <a:rPr lang="en-US" sz="1600" dirty="0"/>
+              <a:t>Alistair, Kaushal, Parvez and Selina</a:t>
             </a:r>
           </a:p>
         </p:txBody>
@@ -3790,7 +3805,7 @@
           <p:cNvPr id="4" name="Title 3">
             <a:extLst>
               <a:ext uri="{FF2B5EF4-FFF2-40B4-BE49-F238E27FC236}">
-                <a16:creationId xmlns:a16="http://schemas.microsoft.com/office/drawing/2014/main" id="{556DD119-F167-E12E-327D-4A3EF1AA6D40}"/>
+                <a16:creationId xmlns:a16="http://schemas.microsoft.com/office/drawing/2014/main" id="{955E3AC9-AA37-8A8D-E2E0-325745B7589C}"/>
               </a:ext>
             </a:extLst>
           </p:cNvPr>
@@ -3808,8 +3823,38 @@
           <a:p>
             <a:r>
               <a:rPr lang="en-AU" dirty="0"/>
-              <a:t>Average Vacancy Days by Bedrooms </a:t>
-            </a:r>
+              <a:t>Untenable and Tenable Vacancy Days by Year </a:t>
+            </a:r>
+          </a:p>
+        </p:txBody>
+      </p:sp>
+      <p:sp>
+        <p:nvSpPr>
+          <p:cNvPr id="5" name="Content Placeholder 4">
+            <a:extLst>
+              <a:ext uri="{FF2B5EF4-FFF2-40B4-BE49-F238E27FC236}">
+                <a16:creationId xmlns:a16="http://schemas.microsoft.com/office/drawing/2014/main" id="{BAFBAFEF-860A-B60F-F016-5910531A5F97}"/>
+              </a:ext>
+            </a:extLst>
+          </p:cNvPr>
+          <p:cNvSpPr>
+            <a:spLocks noGrp="1"/>
+          </p:cNvSpPr>
+          <p:nvPr>
+            <p:ph sz="half" idx="1"/>
+          </p:nvPr>
+        </p:nvSpPr>
+        <p:spPr>
+          <a:xfrm>
+            <a:off x="6515944" y="2350803"/>
+            <a:ext cx="4639736" cy="3748193"/>
+          </a:xfrm>
+        </p:spPr>
+        <p:txBody>
+          <a:bodyPr/>
+          <a:lstStyle/>
+          <a:p>
+            <a:endParaRPr lang="en-AU" dirty="0"/>
           </a:p>
         </p:txBody>
       </p:sp>
@@ -3818,7 +3863,7 @@
           <p:cNvPr id="8" name="Content Placeholder 7">
             <a:extLst>
               <a:ext uri="{FF2B5EF4-FFF2-40B4-BE49-F238E27FC236}">
-                <a16:creationId xmlns:a16="http://schemas.microsoft.com/office/drawing/2014/main" id="{9DE2ACBD-75B8-4718-1EA3-892680109ED2}"/>
+                <a16:creationId xmlns:a16="http://schemas.microsoft.com/office/drawing/2014/main" id="{74EAC48B-A132-C38D-5638-821BE32187E4}"/>
               </a:ext>
             </a:extLst>
           </p:cNvPr>
@@ -3826,7 +3871,7 @@
             <a:picLocks noGrp="1" noChangeAspect="1"/>
           </p:cNvPicPr>
           <p:nvPr>
-            <p:ph sz="half" idx="1"/>
+            <p:ph sz="half" idx="2"/>
           </p:nvPr>
         </p:nvPicPr>
         <p:blipFill>
@@ -3837,40 +3882,15 @@
         </p:blipFill>
         <p:spPr>
           <a:xfrm>
-            <a:off x="1036320" y="2192889"/>
-            <a:ext cx="4856548" cy="3170247"/>
+            <a:off x="889233" y="2350803"/>
+            <a:ext cx="5025006" cy="3477900"/>
           </a:xfrm>
         </p:spPr>
       </p:pic>
-      <p:sp>
-        <p:nvSpPr>
-          <p:cNvPr id="6" name="Content Placeholder 5">
-            <a:extLst>
-              <a:ext uri="{FF2B5EF4-FFF2-40B4-BE49-F238E27FC236}">
-                <a16:creationId xmlns:a16="http://schemas.microsoft.com/office/drawing/2014/main" id="{3EBFA0DC-1430-5E67-9C18-BB015A230090}"/>
-              </a:ext>
-            </a:extLst>
-          </p:cNvPr>
-          <p:cNvSpPr>
-            <a:spLocks noGrp="1"/>
-          </p:cNvSpPr>
-          <p:nvPr>
-            <p:ph sz="half" idx="2"/>
-          </p:nvPr>
-        </p:nvSpPr>
-        <p:spPr/>
-        <p:txBody>
-          <a:bodyPr/>
-          <a:lstStyle/>
-          <a:p>
-            <a:endParaRPr lang="en-AU"/>
-          </a:p>
-        </p:txBody>
-      </p:sp>
     </p:spTree>
     <p:extLst>
       <p:ext uri="{BB962C8B-B14F-4D97-AF65-F5344CB8AC3E}">
-        <p14:creationId xmlns:p14="http://schemas.microsoft.com/office/powerpoint/2010/main" val="3706224563"/>
+        <p14:creationId xmlns:p14="http://schemas.microsoft.com/office/powerpoint/2010/main" val="2733872368"/>
       </p:ext>
     </p:extLst>
   </p:cSld>
@@ -3899,10 +3919,10 @@
       </p:grpSpPr>
       <p:sp>
         <p:nvSpPr>
-          <p:cNvPr id="2" name="Title 1">
+          <p:cNvPr id="4" name="Title 3">
             <a:extLst>
               <a:ext uri="{FF2B5EF4-FFF2-40B4-BE49-F238E27FC236}">
-                <a16:creationId xmlns:a16="http://schemas.microsoft.com/office/drawing/2014/main" id="{22E8E9D2-B507-6C21-4C88-85907E39D135}"/>
+                <a16:creationId xmlns:a16="http://schemas.microsoft.com/office/drawing/2014/main" id="{556DD119-F167-E12E-327D-4A3EF1AA6D40}"/>
               </a:ext>
             </a:extLst>
           </p:cNvPr>
@@ -3920,24 +3940,26 @@
           <a:p>
             <a:r>
               <a:rPr lang="en-AU" dirty="0"/>
-              <a:t>Housing types and bedroom comparison </a:t>
+              <a:t>Average Vacancy Days by Bedrooms </a:t>
             </a:r>
           </a:p>
         </p:txBody>
       </p:sp>
       <p:pic>
         <p:nvPicPr>
-          <p:cNvPr id="6" name="Picture 5">
+          <p:cNvPr id="8" name="Content Placeholder 7">
             <a:extLst>
               <a:ext uri="{FF2B5EF4-FFF2-40B4-BE49-F238E27FC236}">
-                <a16:creationId xmlns:a16="http://schemas.microsoft.com/office/drawing/2014/main" id="{C55F97A6-7D29-789E-569A-3E6FB42AC309}"/>
+                <a16:creationId xmlns:a16="http://schemas.microsoft.com/office/drawing/2014/main" id="{9DE2ACBD-75B8-4718-1EA3-892680109ED2}"/>
               </a:ext>
             </a:extLst>
           </p:cNvPr>
           <p:cNvPicPr>
-            <a:picLocks noChangeAspect="1"/>
+            <a:picLocks noGrp="1" noChangeAspect="1"/>
           </p:cNvPicPr>
-          <p:nvPr/>
+          <p:nvPr>
+            <p:ph sz="half" idx="1"/>
+          </p:nvPr>
         </p:nvPicPr>
         <p:blipFill>
           <a:blip r:embed="rId2"/>
@@ -3947,18 +3969,40 @@
         </p:blipFill>
         <p:spPr>
           <a:xfrm>
-            <a:off x="1097279" y="2086885"/>
-            <a:ext cx="8365503" cy="3946066"/>
+            <a:off x="1036320" y="2192889"/>
+            <a:ext cx="4856548" cy="3170247"/>
           </a:xfrm>
-          <a:prstGeom prst="rect">
-            <a:avLst/>
-          </a:prstGeom>
         </p:spPr>
       </p:pic>
+      <p:sp>
+        <p:nvSpPr>
+          <p:cNvPr id="6" name="Content Placeholder 5">
+            <a:extLst>
+              <a:ext uri="{FF2B5EF4-FFF2-40B4-BE49-F238E27FC236}">
+                <a16:creationId xmlns:a16="http://schemas.microsoft.com/office/drawing/2014/main" id="{3EBFA0DC-1430-5E67-9C18-BB015A230090}"/>
+              </a:ext>
+            </a:extLst>
+          </p:cNvPr>
+          <p:cNvSpPr>
+            <a:spLocks noGrp="1"/>
+          </p:cNvSpPr>
+          <p:nvPr>
+            <p:ph sz="half" idx="2"/>
+          </p:nvPr>
+        </p:nvSpPr>
+        <p:spPr/>
+        <p:txBody>
+          <a:bodyPr/>
+          <a:lstStyle/>
+          <a:p>
+            <a:endParaRPr lang="en-AU"/>
+          </a:p>
+        </p:txBody>
+      </p:sp>
     </p:spTree>
     <p:extLst>
       <p:ext uri="{BB962C8B-B14F-4D97-AF65-F5344CB8AC3E}">
-        <p14:creationId xmlns:p14="http://schemas.microsoft.com/office/powerpoint/2010/main" val="240786751"/>
+        <p14:creationId xmlns:p14="http://schemas.microsoft.com/office/powerpoint/2010/main" val="3706224563"/>
       </p:ext>
     </p:extLst>
   </p:cSld>
@@ -3990,7 +4034,7 @@
           <p:cNvPr id="2" name="Title 1">
             <a:extLst>
               <a:ext uri="{FF2B5EF4-FFF2-40B4-BE49-F238E27FC236}">
-                <a16:creationId xmlns:a16="http://schemas.microsoft.com/office/drawing/2014/main" id="{6213F334-81B7-1BAD-3F70-D167304B2658}"/>
+                <a16:creationId xmlns:a16="http://schemas.microsoft.com/office/drawing/2014/main" id="{22E8E9D2-B507-6C21-4C88-85907E39D135}"/>
               </a:ext>
             </a:extLst>
           </p:cNvPr>
@@ -4008,26 +4052,24 @@
           <a:p>
             <a:r>
               <a:rPr lang="en-AU" dirty="0"/>
-              <a:t>Outliers of vacancy days against bedrooms</a:t>
+              <a:t>Housing types and bedroom comparison </a:t>
             </a:r>
           </a:p>
         </p:txBody>
       </p:sp>
       <p:pic>
         <p:nvPicPr>
-          <p:cNvPr id="6" name="Content Placeholder 5">
+          <p:cNvPr id="4" name="Picture 3">
             <a:extLst>
               <a:ext uri="{FF2B5EF4-FFF2-40B4-BE49-F238E27FC236}">
-                <a16:creationId xmlns:a16="http://schemas.microsoft.com/office/drawing/2014/main" id="{4476BB34-5C1F-92CD-DF39-2E292DD90DD1}"/>
+                <a16:creationId xmlns:a16="http://schemas.microsoft.com/office/drawing/2014/main" id="{5A8DD530-05D1-17A1-E3C5-7A75DB2AF539}"/>
               </a:ext>
             </a:extLst>
           </p:cNvPr>
           <p:cNvPicPr>
-            <a:picLocks noGrp="1" noChangeAspect="1"/>
+            <a:picLocks noChangeAspect="1"/>
           </p:cNvPicPr>
-          <p:nvPr>
-            <p:ph sz="half" idx="1"/>
-          </p:nvPr>
+          <p:nvPr/>
         </p:nvPicPr>
         <p:blipFill>
           <a:blip r:embed="rId2"/>
@@ -4037,40 +4079,18 @@
         </p:blipFill>
         <p:spPr>
           <a:xfrm>
-            <a:off x="1193006" y="2120900"/>
-            <a:ext cx="4448175" cy="3382278"/>
+            <a:off x="1675089" y="2035028"/>
+            <a:ext cx="8114863" cy="4057432"/>
           </a:xfrm>
+          <a:prstGeom prst="rect">
+            <a:avLst/>
+          </a:prstGeom>
         </p:spPr>
       </p:pic>
-      <p:sp>
-        <p:nvSpPr>
-          <p:cNvPr id="4" name="Content Placeholder 3">
-            <a:extLst>
-              <a:ext uri="{FF2B5EF4-FFF2-40B4-BE49-F238E27FC236}">
-                <a16:creationId xmlns:a16="http://schemas.microsoft.com/office/drawing/2014/main" id="{07B84EA5-AA0D-FBEA-FF50-60E262488F00}"/>
-              </a:ext>
-            </a:extLst>
-          </p:cNvPr>
-          <p:cNvSpPr>
-            <a:spLocks noGrp="1"/>
-          </p:cNvSpPr>
-          <p:nvPr>
-            <p:ph sz="half" idx="2"/>
-          </p:nvPr>
-        </p:nvSpPr>
-        <p:spPr/>
-        <p:txBody>
-          <a:bodyPr/>
-          <a:lstStyle/>
-          <a:p>
-            <a:endParaRPr lang="en-AU"/>
-          </a:p>
-        </p:txBody>
-      </p:sp>
     </p:spTree>
     <p:extLst>
       <p:ext uri="{BB962C8B-B14F-4D97-AF65-F5344CB8AC3E}">
-        <p14:creationId xmlns:p14="http://schemas.microsoft.com/office/powerpoint/2010/main" val="1260351518"/>
+        <p14:creationId xmlns:p14="http://schemas.microsoft.com/office/powerpoint/2010/main" val="240786751"/>
       </p:ext>
     </p:extLst>
   </p:cSld>
@@ -4102,6 +4122,118 @@
           <p:cNvPr id="2" name="Title 1">
             <a:extLst>
               <a:ext uri="{FF2B5EF4-FFF2-40B4-BE49-F238E27FC236}">
+                <a16:creationId xmlns:a16="http://schemas.microsoft.com/office/drawing/2014/main" id="{6213F334-81B7-1BAD-3F70-D167304B2658}"/>
+              </a:ext>
+            </a:extLst>
+          </p:cNvPr>
+          <p:cNvSpPr>
+            <a:spLocks noGrp="1"/>
+          </p:cNvSpPr>
+          <p:nvPr>
+            <p:ph type="title"/>
+          </p:nvPr>
+        </p:nvSpPr>
+        <p:spPr/>
+        <p:txBody>
+          <a:bodyPr/>
+          <a:lstStyle/>
+          <a:p>
+            <a:r>
+              <a:rPr lang="en-AU" dirty="0"/>
+              <a:t>Outliers of vacancy days against bedrooms</a:t>
+            </a:r>
+          </a:p>
+        </p:txBody>
+      </p:sp>
+      <p:pic>
+        <p:nvPicPr>
+          <p:cNvPr id="6" name="Content Placeholder 5">
+            <a:extLst>
+              <a:ext uri="{FF2B5EF4-FFF2-40B4-BE49-F238E27FC236}">
+                <a16:creationId xmlns:a16="http://schemas.microsoft.com/office/drawing/2014/main" id="{4476BB34-5C1F-92CD-DF39-2E292DD90DD1}"/>
+              </a:ext>
+            </a:extLst>
+          </p:cNvPr>
+          <p:cNvPicPr>
+            <a:picLocks noGrp="1" noChangeAspect="1"/>
+          </p:cNvPicPr>
+          <p:nvPr>
+            <p:ph sz="half" idx="1"/>
+          </p:nvPr>
+        </p:nvPicPr>
+        <p:blipFill>
+          <a:blip r:embed="rId2"/>
+          <a:stretch>
+            <a:fillRect/>
+          </a:stretch>
+        </p:blipFill>
+        <p:spPr>
+          <a:xfrm>
+            <a:off x="1193006" y="2120900"/>
+            <a:ext cx="4448175" cy="3382278"/>
+          </a:xfrm>
+        </p:spPr>
+      </p:pic>
+      <p:sp>
+        <p:nvSpPr>
+          <p:cNvPr id="4" name="Content Placeholder 3">
+            <a:extLst>
+              <a:ext uri="{FF2B5EF4-FFF2-40B4-BE49-F238E27FC236}">
+                <a16:creationId xmlns:a16="http://schemas.microsoft.com/office/drawing/2014/main" id="{07B84EA5-AA0D-FBEA-FF50-60E262488F00}"/>
+              </a:ext>
+            </a:extLst>
+          </p:cNvPr>
+          <p:cNvSpPr>
+            <a:spLocks noGrp="1"/>
+          </p:cNvSpPr>
+          <p:nvPr>
+            <p:ph sz="half" idx="2"/>
+          </p:nvPr>
+        </p:nvSpPr>
+        <p:spPr/>
+        <p:txBody>
+          <a:bodyPr/>
+          <a:lstStyle/>
+          <a:p>
+            <a:endParaRPr lang="en-AU" dirty="0"/>
+          </a:p>
+        </p:txBody>
+      </p:sp>
+    </p:spTree>
+    <p:extLst>
+      <p:ext uri="{BB962C8B-B14F-4D97-AF65-F5344CB8AC3E}">
+        <p14:creationId xmlns:p14="http://schemas.microsoft.com/office/powerpoint/2010/main" val="1260351518"/>
+      </p:ext>
+    </p:extLst>
+  </p:cSld>
+  <p:clrMapOvr>
+    <a:masterClrMapping/>
+  </p:clrMapOvr>
+</p:sld>
+</file>
+
+<file path=ppt/slides/slide14.xml><?xml version="1.0" encoding="utf-8"?>
+<p:sld xmlns:a="http://schemas.openxmlformats.org/drawingml/2006/main" xmlns:r="http://schemas.openxmlformats.org/officeDocument/2006/relationships" xmlns:p="http://schemas.openxmlformats.org/presentationml/2006/main">
+  <p:cSld>
+    <p:spTree>
+      <p:nvGrpSpPr>
+        <p:cNvPr id="1" name=""/>
+        <p:cNvGrpSpPr/>
+        <p:nvPr/>
+      </p:nvGrpSpPr>
+      <p:grpSpPr>
+        <a:xfrm>
+          <a:off x="0" y="0"/>
+          <a:ext cx="0" cy="0"/>
+          <a:chOff x="0" y="0"/>
+          <a:chExt cx="0" cy="0"/>
+        </a:xfrm>
+      </p:grpSpPr>
+      <p:sp>
+        <p:nvSpPr>
+          <p:cNvPr id="2" name="Title 1">
+            <a:extLst>
+              <a:ext uri="{FF2B5EF4-FFF2-40B4-BE49-F238E27FC236}">
                 <a16:creationId xmlns:a16="http://schemas.microsoft.com/office/drawing/2014/main" id="{65A32D54-0386-F374-3BAC-0284D58F5212}"/>
               </a:ext>
             </a:extLst>
@@ -4175,7 +4307,10 @@
           <a:bodyPr/>
           <a:lstStyle/>
           <a:p>
-            <a:endParaRPr lang="en-AU"/>
+            <a:r>
+              <a:rPr lang="en-AU" dirty="0"/>
+              <a:t>- Removing 3 outliers ( 7412, 326, 287)</a:t>
+            </a:r>
           </a:p>
         </p:txBody>
       </p:sp>
@@ -4192,7 +4327,256 @@
 </p:sld>
 </file>
 
-<file path=ppt/slides/slide14.xml><?xml version="1.0" encoding="utf-8"?>
+<file path=ppt/slides/slide15.xml><?xml version="1.0" encoding="utf-8"?>
+<p:sld xmlns:a="http://schemas.openxmlformats.org/drawingml/2006/main" xmlns:r="http://schemas.openxmlformats.org/officeDocument/2006/relationships" xmlns:p="http://schemas.openxmlformats.org/presentationml/2006/main">
+  <p:cSld>
+    <p:spTree>
+      <p:nvGrpSpPr>
+        <p:cNvPr id="1" name=""/>
+        <p:cNvGrpSpPr/>
+        <p:nvPr/>
+      </p:nvGrpSpPr>
+      <p:grpSpPr>
+        <a:xfrm>
+          <a:off x="0" y="0"/>
+          <a:ext cx="0" cy="0"/>
+          <a:chOff x="0" y="0"/>
+          <a:chExt cx="0" cy="0"/>
+        </a:xfrm>
+      </p:grpSpPr>
+      <p:sp>
+        <p:nvSpPr>
+          <p:cNvPr id="2" name="Title 1">
+            <a:extLst>
+              <a:ext uri="{FF2B5EF4-FFF2-40B4-BE49-F238E27FC236}">
+                <a16:creationId xmlns:a16="http://schemas.microsoft.com/office/drawing/2014/main" id="{8DF49682-8AD5-10FB-3619-CA604CBFD3A2}"/>
+              </a:ext>
+            </a:extLst>
+          </p:cNvPr>
+          <p:cNvSpPr>
+            <a:spLocks noGrp="1"/>
+          </p:cNvSpPr>
+          <p:nvPr>
+            <p:ph type="title"/>
+          </p:nvPr>
+        </p:nvSpPr>
+        <p:spPr/>
+        <p:txBody>
+          <a:bodyPr/>
+          <a:lstStyle/>
+          <a:p>
+            <a:r>
+              <a:rPr lang="en-AU" dirty="0"/>
+              <a:t>Size of Dwelling </a:t>
+            </a:r>
+          </a:p>
+        </p:txBody>
+      </p:sp>
+      <p:sp>
+        <p:nvSpPr>
+          <p:cNvPr id="3" name="Content Placeholder 2">
+            <a:extLst>
+              <a:ext uri="{FF2B5EF4-FFF2-40B4-BE49-F238E27FC236}">
+                <a16:creationId xmlns:a16="http://schemas.microsoft.com/office/drawing/2014/main" id="{8E6312B2-B9CD-7799-DC12-D6D5366B2857}"/>
+              </a:ext>
+            </a:extLst>
+          </p:cNvPr>
+          <p:cNvSpPr>
+            <a:spLocks noGrp="1"/>
+          </p:cNvSpPr>
+          <p:nvPr>
+            <p:ph sz="half" idx="1"/>
+          </p:nvPr>
+        </p:nvSpPr>
+        <p:spPr/>
+        <p:txBody>
+          <a:bodyPr/>
+          <a:lstStyle/>
+          <a:p>
+            <a:endParaRPr lang="en-AU"/>
+          </a:p>
+        </p:txBody>
+      </p:sp>
+      <p:sp>
+        <p:nvSpPr>
+          <p:cNvPr id="4" name="Content Placeholder 3">
+            <a:extLst>
+              <a:ext uri="{FF2B5EF4-FFF2-40B4-BE49-F238E27FC236}">
+                <a16:creationId xmlns:a16="http://schemas.microsoft.com/office/drawing/2014/main" id="{672F4D51-A31E-5312-7649-EB54F0B411B4}"/>
+              </a:ext>
+            </a:extLst>
+          </p:cNvPr>
+          <p:cNvSpPr>
+            <a:spLocks noGrp="1"/>
+          </p:cNvSpPr>
+          <p:nvPr>
+            <p:ph sz="half" idx="2"/>
+          </p:nvPr>
+        </p:nvSpPr>
+        <p:spPr/>
+        <p:txBody>
+          <a:bodyPr/>
+          <a:lstStyle/>
+          <a:p>
+            <a:endParaRPr lang="en-AU"/>
+          </a:p>
+        </p:txBody>
+      </p:sp>
+    </p:spTree>
+    <p:extLst>
+      <p:ext uri="{BB962C8B-B14F-4D97-AF65-F5344CB8AC3E}">
+        <p14:creationId xmlns:p14="http://schemas.microsoft.com/office/powerpoint/2010/main" val="3044815388"/>
+      </p:ext>
+    </p:extLst>
+  </p:cSld>
+  <p:clrMapOvr>
+    <a:masterClrMapping/>
+  </p:clrMapOvr>
+</p:sld>
+</file>
+
+<file path=ppt/slides/slide16.xml><?xml version="1.0" encoding="utf-8"?>
+<p:sld xmlns:a="http://schemas.openxmlformats.org/drawingml/2006/main" xmlns:r="http://schemas.openxmlformats.org/officeDocument/2006/relationships" xmlns:p="http://schemas.openxmlformats.org/presentationml/2006/main">
+  <p:cSld>
+    <p:spTree>
+      <p:nvGrpSpPr>
+        <p:cNvPr id="1" name=""/>
+        <p:cNvGrpSpPr/>
+        <p:nvPr/>
+      </p:nvGrpSpPr>
+      <p:grpSpPr>
+        <a:xfrm>
+          <a:off x="0" y="0"/>
+          <a:ext cx="0" cy="0"/>
+          <a:chOff x="0" y="0"/>
+          <a:chExt cx="0" cy="0"/>
+        </a:xfrm>
+      </p:grpSpPr>
+      <p:sp>
+        <p:nvSpPr>
+          <p:cNvPr id="2" name="Title 1">
+            <a:extLst>
+              <a:ext uri="{FF2B5EF4-FFF2-40B4-BE49-F238E27FC236}">
+                <a16:creationId xmlns:a16="http://schemas.microsoft.com/office/drawing/2014/main" id="{11846F38-FF99-E374-F7CB-C18D70B77E26}"/>
+              </a:ext>
+            </a:extLst>
+          </p:cNvPr>
+          <p:cNvSpPr>
+            <a:spLocks noGrp="1"/>
+          </p:cNvSpPr>
+          <p:nvPr>
+            <p:ph type="title"/>
+          </p:nvPr>
+        </p:nvSpPr>
+        <p:spPr/>
+        <p:txBody>
+          <a:bodyPr/>
+          <a:lstStyle/>
+          <a:p>
+            <a:r>
+              <a:rPr lang="en-AU" dirty="0"/>
+              <a:t>Null Hypothesis </a:t>
+            </a:r>
+          </a:p>
+        </p:txBody>
+      </p:sp>
+      <p:sp>
+        <p:nvSpPr>
+          <p:cNvPr id="3" name="Content Placeholder 2">
+            <a:extLst>
+              <a:ext uri="{FF2B5EF4-FFF2-40B4-BE49-F238E27FC236}">
+                <a16:creationId xmlns:a16="http://schemas.microsoft.com/office/drawing/2014/main" id="{F5391B62-2ACC-BEF1-5F87-063DFD8314BA}"/>
+              </a:ext>
+            </a:extLst>
+          </p:cNvPr>
+          <p:cNvSpPr>
+            <a:spLocks noGrp="1"/>
+          </p:cNvSpPr>
+          <p:nvPr>
+            <p:ph idx="1"/>
+          </p:nvPr>
+        </p:nvSpPr>
+        <p:spPr/>
+        <p:txBody>
+          <a:bodyPr/>
+          <a:lstStyle/>
+          <a:p>
+            <a:endParaRPr lang="en-AU" dirty="0"/>
+          </a:p>
+        </p:txBody>
+      </p:sp>
+    </p:spTree>
+    <p:extLst>
+      <p:ext uri="{BB962C8B-B14F-4D97-AF65-F5344CB8AC3E}">
+        <p14:creationId xmlns:p14="http://schemas.microsoft.com/office/powerpoint/2010/main" val="2637894539"/>
+      </p:ext>
+    </p:extLst>
+  </p:cSld>
+  <p:clrMapOvr>
+    <a:masterClrMapping/>
+  </p:clrMapOvr>
+</p:sld>
+</file>
+
+<file path=ppt/slides/slide17.xml><?xml version="1.0" encoding="utf-8"?>
+<p:sld xmlns:a="http://schemas.openxmlformats.org/drawingml/2006/main" xmlns:r="http://schemas.openxmlformats.org/officeDocument/2006/relationships" xmlns:p="http://schemas.openxmlformats.org/presentationml/2006/main">
+  <p:cSld>
+    <p:spTree>
+      <p:nvGrpSpPr>
+        <p:cNvPr id="1" name=""/>
+        <p:cNvGrpSpPr/>
+        <p:nvPr/>
+      </p:nvGrpSpPr>
+      <p:grpSpPr>
+        <a:xfrm>
+          <a:off x="0" y="0"/>
+          <a:ext cx="0" cy="0"/>
+          <a:chOff x="0" y="0"/>
+          <a:chExt cx="0" cy="0"/>
+        </a:xfrm>
+      </p:grpSpPr>
+      <p:sp>
+        <p:nvSpPr>
+          <p:cNvPr id="2" name="Title 1">
+            <a:extLst>
+              <a:ext uri="{FF2B5EF4-FFF2-40B4-BE49-F238E27FC236}">
+                <a16:creationId xmlns:a16="http://schemas.microsoft.com/office/drawing/2014/main" id="{5CEC80D2-B18E-0C86-2C81-9802FCDEFC46}"/>
+              </a:ext>
+            </a:extLst>
+          </p:cNvPr>
+          <p:cNvSpPr>
+            <a:spLocks noGrp="1"/>
+          </p:cNvSpPr>
+          <p:nvPr>
+            <p:ph type="title"/>
+          </p:nvPr>
+        </p:nvSpPr>
+        <p:spPr/>
+        <p:txBody>
+          <a:bodyPr/>
+          <a:lstStyle/>
+          <a:p>
+            <a:r>
+              <a:rPr lang="en-AU" dirty="0"/>
+              <a:t>Affects of Housing from Covid</a:t>
+            </a:r>
+          </a:p>
+        </p:txBody>
+      </p:sp>
+    </p:spTree>
+    <p:extLst>
+      <p:ext uri="{BB962C8B-B14F-4D97-AF65-F5344CB8AC3E}">
+        <p14:creationId xmlns:p14="http://schemas.microsoft.com/office/powerpoint/2010/main" val="3808628806"/>
+      </p:ext>
+    </p:extLst>
+  </p:cSld>
+  <p:clrMapOvr>
+    <a:masterClrMapping/>
+  </p:clrMapOvr>
+</p:sld>
+</file>
+
+<file path=ppt/slides/slide18.xml><?xml version="1.0" encoding="utf-8"?>
 <p:sld xmlns:a="http://schemas.openxmlformats.org/drawingml/2006/main" xmlns:r="http://schemas.openxmlformats.org/officeDocument/2006/relationships" xmlns:p="http://schemas.openxmlformats.org/presentationml/2006/main">
   <p:cSld>
     <p:bg>
@@ -4887,7 +5271,7 @@
 </p:sld>
 </file>
 
-<file path=ppt/slides/slide15.xml><?xml version="1.0" encoding="utf-8"?>
+<file path=ppt/slides/slide19.xml><?xml version="1.0" encoding="utf-8"?>
 <p:sld xmlns:a="http://schemas.openxmlformats.org/drawingml/2006/main" xmlns:r="http://schemas.openxmlformats.org/officeDocument/2006/relationships" xmlns:p="http://schemas.openxmlformats.org/presentationml/2006/main">
   <p:cSld>
     <p:spTree>
@@ -4961,89 +5345,6 @@
     <p:extLst>
       <p:ext uri="{BB962C8B-B14F-4D97-AF65-F5344CB8AC3E}">
         <p14:creationId xmlns:p14="http://schemas.microsoft.com/office/powerpoint/2010/main" val="3892008798"/>
-      </p:ext>
-    </p:extLst>
-  </p:cSld>
-  <p:clrMapOvr>
-    <a:masterClrMapping/>
-  </p:clrMapOvr>
-</p:sld>
-</file>
-
-<file path=ppt/slides/slide16.xml><?xml version="1.0" encoding="utf-8"?>
-<p:sld xmlns:a="http://schemas.openxmlformats.org/drawingml/2006/main" xmlns:r="http://schemas.openxmlformats.org/officeDocument/2006/relationships" xmlns:p="http://schemas.openxmlformats.org/presentationml/2006/main">
-  <p:cSld>
-    <p:spTree>
-      <p:nvGrpSpPr>
-        <p:cNvPr id="1" name=""/>
-        <p:cNvGrpSpPr/>
-        <p:nvPr/>
-      </p:nvGrpSpPr>
-      <p:grpSpPr>
-        <a:xfrm>
-          <a:off x="0" y="0"/>
-          <a:ext cx="0" cy="0"/>
-          <a:chOff x="0" y="0"/>
-          <a:chExt cx="0" cy="0"/>
-        </a:xfrm>
-      </p:grpSpPr>
-      <p:sp>
-        <p:nvSpPr>
-          <p:cNvPr id="2" name="Title 1">
-            <a:extLst>
-              <a:ext uri="{FF2B5EF4-FFF2-40B4-BE49-F238E27FC236}">
-                <a16:creationId xmlns:a16="http://schemas.microsoft.com/office/drawing/2014/main" id="{65BA0F5C-A0B7-605F-D27D-B6C5CE31C850}"/>
-              </a:ext>
-            </a:extLst>
-          </p:cNvPr>
-          <p:cNvSpPr>
-            <a:spLocks noGrp="1"/>
-          </p:cNvSpPr>
-          <p:nvPr>
-            <p:ph type="title"/>
-          </p:nvPr>
-        </p:nvSpPr>
-        <p:spPr/>
-        <p:txBody>
-          <a:bodyPr/>
-          <a:lstStyle/>
-          <a:p>
-            <a:r>
-              <a:rPr lang="en-AU" dirty="0"/>
-              <a:t>Conclusion</a:t>
-            </a:r>
-          </a:p>
-        </p:txBody>
-      </p:sp>
-      <p:sp>
-        <p:nvSpPr>
-          <p:cNvPr id="3" name="Content Placeholder 2">
-            <a:extLst>
-              <a:ext uri="{FF2B5EF4-FFF2-40B4-BE49-F238E27FC236}">
-                <a16:creationId xmlns:a16="http://schemas.microsoft.com/office/drawing/2014/main" id="{C4F8990B-566F-C941-A59F-20287C1B4C83}"/>
-              </a:ext>
-            </a:extLst>
-          </p:cNvPr>
-          <p:cNvSpPr>
-            <a:spLocks noGrp="1"/>
-          </p:cNvSpPr>
-          <p:nvPr>
-            <p:ph idx="1"/>
-          </p:nvPr>
-        </p:nvSpPr>
-        <p:spPr/>
-        <p:txBody>
-          <a:bodyPr/>
-          <a:lstStyle/>
-          <a:p>
-            <a:endParaRPr lang="en-AU"/>
-          </a:p>
-        </p:txBody>
-      </p:sp>
-    </p:spTree>
-    <p:extLst>
-      <p:ext uri="{BB962C8B-B14F-4D97-AF65-F5344CB8AC3E}">
-        <p14:creationId xmlns:p14="http://schemas.microsoft.com/office/powerpoint/2010/main" val="3561853324"/>
       </p:ext>
     </p:extLst>
   </p:cSld>
@@ -5075,7 +5376,7 @@
           <p:cNvPr id="2" name="Title 1">
             <a:extLst>
               <a:ext uri="{FF2B5EF4-FFF2-40B4-BE49-F238E27FC236}">
-                <a16:creationId xmlns:a16="http://schemas.microsoft.com/office/drawing/2014/main" id="{26132F41-B14D-099F-7D60-C71AED44720E}"/>
+                <a16:creationId xmlns:a16="http://schemas.microsoft.com/office/drawing/2014/main" id="{F8F9E284-6642-B87F-627B-C7159F981050}"/>
               </a:ext>
             </a:extLst>
           </p:cNvPr>
@@ -5093,7 +5394,7 @@
           <a:p>
             <a:r>
               <a:rPr lang="en-AU" dirty="0"/>
-              <a:t>Eligibility for Housing </a:t>
+              <a:t>	Definition </a:t>
             </a:r>
           </a:p>
         </p:txBody>
@@ -5103,7 +5404,7 @@
           <p:cNvPr id="3" name="Content Placeholder 2">
             <a:extLst>
               <a:ext uri="{FF2B5EF4-FFF2-40B4-BE49-F238E27FC236}">
-                <a16:creationId xmlns:a16="http://schemas.microsoft.com/office/drawing/2014/main" id="{C4DBBA71-3A8F-3EF2-1678-45D100E82CB7}"/>
+                <a16:creationId xmlns:a16="http://schemas.microsoft.com/office/drawing/2014/main" id="{B22E6F46-0BB9-4407-6908-C3D151836A85}"/>
               </a:ext>
             </a:extLst>
           </p:cNvPr>
@@ -5117,179 +5418,206 @@
         <p:spPr/>
         <p:txBody>
           <a:bodyPr>
-            <a:normAutofit fontScale="25000" lnSpcReduction="20000"/>
+            <a:normAutofit fontScale="92500" lnSpcReduction="20000"/>
           </a:bodyPr>
           <a:lstStyle/>
           <a:p>
             <a:pPr>
               <a:lnSpc>
-                <a:spcPct val="127000"/>
+                <a:spcPct val="117000"/>
               </a:lnSpc>
               <a:spcAft>
                 <a:spcPts val="600"/>
               </a:spcAft>
             </a:pPr>
             <a:r>
-              <a:rPr lang="en-AU" sz="7200" dirty="0">
+              <a:rPr lang="en-AU" dirty="0">
                 <a:solidFill>
                   <a:srgbClr val="1D1C1D"/>
                 </a:solidFill>
                 <a:latin typeface="Arial" panose="020B0604020202020204" pitchFamily="34" charset="0"/>
                 <a:cs typeface="Times New Roman" panose="02020603050405020304" pitchFamily="18" charset="0"/>
               </a:rPr>
-              <a:t>1. </a:t>
-            </a:r>
-            <a:r>
-              <a:rPr lang="en-GB" sz="7200" dirty="0">
+              <a:t>Vacancy Days – </a:t>
+            </a:r>
+            <a:r>
+              <a:rPr lang="en-GB" dirty="0">
                 <a:solidFill>
                   <a:srgbClr val="1D1C1D"/>
                 </a:solidFill>
                 <a:latin typeface="Arial" panose="020B0604020202020204" pitchFamily="34" charset="0"/>
                 <a:cs typeface="Times New Roman" panose="02020603050405020304" pitchFamily="18" charset="0"/>
               </a:rPr>
-              <a:t>Australian citizenship and residency status</a:t>
-            </a:r>
+              <a:t>the number of days between the date such existing tenant vacates</a:t>
+            </a:r>
+            <a:endParaRPr lang="en-AU" dirty="0">
+              <a:solidFill>
+                <a:srgbClr val="1D1C1D"/>
+              </a:solidFill>
+              <a:latin typeface="Arial" panose="020B0604020202020204" pitchFamily="34" charset="0"/>
+              <a:cs typeface="Times New Roman" panose="02020603050405020304" pitchFamily="18" charset="0"/>
+            </a:endParaRPr>
           </a:p>
           <a:p>
             <a:pPr>
               <a:lnSpc>
-                <a:spcPct val="127000"/>
+                <a:spcPct val="117000"/>
               </a:lnSpc>
               <a:spcAft>
                 <a:spcPts val="600"/>
               </a:spcAft>
             </a:pPr>
             <a:r>
-              <a:rPr lang="en-AU" sz="7200" dirty="0">
+              <a:rPr lang="en-GB" dirty="0">
                 <a:solidFill>
                   <a:srgbClr val="1D1C1D"/>
                 </a:solidFill>
                 <a:latin typeface="Arial" panose="020B0604020202020204" pitchFamily="34" charset="0"/>
                 <a:cs typeface="Times New Roman" panose="02020603050405020304" pitchFamily="18" charset="0"/>
               </a:rPr>
-              <a:t>2. Queensland residency</a:t>
+              <a:t>Tenantable -  (of a building) fit for occupation by a tenant.</a:t>
             </a:r>
           </a:p>
           <a:p>
             <a:pPr>
               <a:lnSpc>
-                <a:spcPct val="127000"/>
+                <a:spcPct val="117000"/>
               </a:lnSpc>
               <a:spcAft>
                 <a:spcPts val="600"/>
               </a:spcAft>
             </a:pPr>
             <a:r>
-              <a:rPr lang="en-AU" sz="7200" dirty="0">
+              <a:rPr lang="en-GB" dirty="0">
                 <a:solidFill>
                   <a:srgbClr val="1D1C1D"/>
                 </a:solidFill>
                 <a:latin typeface="Arial" panose="020B0604020202020204" pitchFamily="34" charset="0"/>
                 <a:cs typeface="Times New Roman" panose="02020603050405020304" pitchFamily="18" charset="0"/>
               </a:rPr>
-              <a:t>3. No Property ownership </a:t>
+              <a:t>Untenantable - incapable of being occupied or lived in</a:t>
             </a:r>
           </a:p>
           <a:p>
             <a:pPr>
               <a:lnSpc>
-                <a:spcPct val="127000"/>
+                <a:spcPct val="117000"/>
               </a:lnSpc>
               <a:spcAft>
                 <a:spcPts val="600"/>
               </a:spcAft>
             </a:pPr>
             <a:r>
-              <a:rPr lang="en-AU" sz="7200" dirty="0">
+              <a:rPr lang="en-AU" dirty="0" err="1">
                 <a:solidFill>
                   <a:srgbClr val="1D1C1D"/>
                 </a:solidFill>
                 <a:latin typeface="Arial" panose="020B0604020202020204" pitchFamily="34" charset="0"/>
                 <a:cs typeface="Times New Roman" panose="02020603050405020304" pitchFamily="18" charset="0"/>
               </a:rPr>
-              <a:t>4. Liquid asset test (Single – under $117k and 2 or more under $149k) </a:t>
-            </a:r>
-          </a:p>
-          <a:p>
-            <a:pPr>
-              <a:lnSpc>
-                <a:spcPct val="127000"/>
-              </a:lnSpc>
-              <a:spcAft>
-                <a:spcPts val="600"/>
-              </a:spcAft>
-            </a:pPr>
-            <a:r>
-              <a:rPr lang="en-AU" sz="7200" dirty="0">
+              <a:t>VUDays</a:t>
+            </a:r>
+            <a:r>
+              <a:rPr lang="en-AU" dirty="0">
                 <a:solidFill>
                   <a:srgbClr val="1D1C1D"/>
                 </a:solidFill>
                 <a:latin typeface="Arial" panose="020B0604020202020204" pitchFamily="34" charset="0"/>
                 <a:cs typeface="Times New Roman" panose="02020603050405020304" pitchFamily="18" charset="0"/>
               </a:rPr>
-              <a:t>5. Independent Income ( $226.81 per week with proof of min 4 weeks)</a:t>
-            </a:r>
-          </a:p>
-          <a:p>
-            <a:pPr>
-              <a:lnSpc>
-                <a:spcPct val="127000"/>
-              </a:lnSpc>
-              <a:spcAft>
-                <a:spcPts val="600"/>
-              </a:spcAft>
-            </a:pPr>
-            <a:r>
-              <a:rPr lang="en-AU" sz="7200" dirty="0">
+              <a:t> - </a:t>
+            </a:r>
+            <a:r>
+              <a:rPr lang="en-GB" dirty="0">
                 <a:solidFill>
                   <a:srgbClr val="1D1C1D"/>
                 </a:solidFill>
                 <a:latin typeface="Arial" panose="020B0604020202020204" pitchFamily="34" charset="0"/>
                 <a:cs typeface="Times New Roman" panose="02020603050405020304" pitchFamily="18" charset="0"/>
               </a:rPr>
-              <a:t>6. Household income must fall below $609 to $1121 per week ( depending on family size)</a:t>
+              <a:t>Number of days the property was vacant and untenantable </a:t>
             </a:r>
           </a:p>
           <a:p>
             <a:pPr>
               <a:lnSpc>
-                <a:spcPct val="127000"/>
+                <a:spcPct val="117000"/>
               </a:lnSpc>
               <a:spcAft>
                 <a:spcPts val="600"/>
               </a:spcAft>
             </a:pPr>
             <a:r>
-              <a:rPr lang="en-GB" sz="7200" dirty="0">
+              <a:rPr lang="en-AU" dirty="0" err="1">
                 <a:solidFill>
                   <a:srgbClr val="1D1C1D"/>
                 </a:solidFill>
                 <a:latin typeface="Arial" panose="020B0604020202020204" pitchFamily="34" charset="0"/>
                 <a:cs typeface="Times New Roman" panose="02020603050405020304" pitchFamily="18" charset="0"/>
               </a:rPr>
-              <a:t>7. Wellbeing</a:t>
-            </a:r>
-          </a:p>
-          <a:p>
-            <a:endParaRPr lang="en-GB" b="1" i="0" dirty="0">
+              <a:t>VTDays</a:t>
+            </a:r>
+            <a:r>
+              <a:rPr lang="en-AU" dirty="0">
+                <a:solidFill>
+                  <a:srgbClr val="1D1C1D"/>
+                </a:solidFill>
+                <a:latin typeface="Arial" panose="020B0604020202020204" pitchFamily="34" charset="0"/>
+                <a:cs typeface="Times New Roman" panose="02020603050405020304" pitchFamily="18" charset="0"/>
+              </a:rPr>
+              <a:t> – </a:t>
+            </a:r>
+            <a:r>
+              <a:rPr lang="en-GB" dirty="0">
+                <a:solidFill>
+                  <a:srgbClr val="1D1C1D"/>
+                </a:solidFill>
+                <a:latin typeface="Arial" panose="020B0604020202020204" pitchFamily="34" charset="0"/>
+                <a:cs typeface="Times New Roman" panose="02020603050405020304" pitchFamily="18" charset="0"/>
+              </a:rPr>
+              <a:t>Number of days the property was vacant and tenantable </a:t>
+            </a:r>
+          </a:p>
+          <a:p>
+            <a:endParaRPr lang="en-AU" sz="2000" b="0" i="0" u="none" strike="noStrike" dirty="0">
               <a:solidFill>
-                <a:srgbClr val="212529"/>
+                <a:srgbClr val="000000"/>
               </a:solidFill>
               <a:effectLst/>
-              <a:latin typeface="Lato" panose="020F0502020204030203" pitchFamily="34" charset="0"/>
+              <a:latin typeface="Calibri" panose="020F0502020204030204" pitchFamily="34" charset="0"/>
             </a:endParaRPr>
           </a:p>
           <a:p>
-            <a:r>
-              <a:rPr lang="en-AU" dirty="0"/>
+            <a:endParaRPr lang="en-GB" sz="2000" b="0" i="0" u="none" strike="noStrike" dirty="0">
+              <a:solidFill>
+                <a:srgbClr val="000000"/>
+              </a:solidFill>
+              <a:effectLst/>
+              <a:latin typeface="Calibri" panose="020F0502020204030204" pitchFamily="34" charset="0"/>
+            </a:endParaRPr>
+          </a:p>
+          <a:p>
+            <a:r>
+              <a:rPr lang="en-GB" sz="2000" b="0" i="0" u="none" strike="noStrike" dirty="0">
+                <a:solidFill>
+                  <a:srgbClr val="000000"/>
+                </a:solidFill>
+                <a:effectLst/>
+                <a:latin typeface="Calibri" panose="020F0502020204030204" pitchFamily="34" charset="0"/>
+              </a:rPr>
               <a:t> </a:t>
             </a:r>
-            <a:r>
-              <a:rPr lang="en-AU" dirty="0">
-                <a:sym typeface="Wingdings" panose="05000000000000000000" pitchFamily="2" charset="2"/>
-              </a:rPr>
-              <a:t> https://www.qld.gov.au/housing/public-community-housing/eligibility-applying-for-housing/eligibility-for-housing/check-your-eligibility</a:t>
-            </a:r>
+          </a:p>
+          <a:p>
+            <a:endParaRPr lang="en-AU" sz="2000" b="0" i="0" u="none" strike="noStrike" dirty="0">
+              <a:solidFill>
+                <a:srgbClr val="000000"/>
+              </a:solidFill>
+              <a:effectLst/>
+              <a:latin typeface="Calibri" panose="020F0502020204030204" pitchFamily="34" charset="0"/>
+            </a:endParaRPr>
+          </a:p>
+          <a:p>
             <a:endParaRPr lang="en-AU" dirty="0"/>
           </a:p>
         </p:txBody>
@@ -5297,7 +5625,90 @@
     </p:spTree>
     <p:extLst>
       <p:ext uri="{BB962C8B-B14F-4D97-AF65-F5344CB8AC3E}">
-        <p14:creationId xmlns:p14="http://schemas.microsoft.com/office/powerpoint/2010/main" val="1316716995"/>
+        <p14:creationId xmlns:p14="http://schemas.microsoft.com/office/powerpoint/2010/main" val="2656581410"/>
+      </p:ext>
+    </p:extLst>
+  </p:cSld>
+  <p:clrMapOvr>
+    <a:masterClrMapping/>
+  </p:clrMapOvr>
+</p:sld>
+</file>
+
+<file path=ppt/slides/slide20.xml><?xml version="1.0" encoding="utf-8"?>
+<p:sld xmlns:a="http://schemas.openxmlformats.org/drawingml/2006/main" xmlns:r="http://schemas.openxmlformats.org/officeDocument/2006/relationships" xmlns:p="http://schemas.openxmlformats.org/presentationml/2006/main">
+  <p:cSld>
+    <p:spTree>
+      <p:nvGrpSpPr>
+        <p:cNvPr id="1" name=""/>
+        <p:cNvGrpSpPr/>
+        <p:nvPr/>
+      </p:nvGrpSpPr>
+      <p:grpSpPr>
+        <a:xfrm>
+          <a:off x="0" y="0"/>
+          <a:ext cx="0" cy="0"/>
+          <a:chOff x="0" y="0"/>
+          <a:chExt cx="0" cy="0"/>
+        </a:xfrm>
+      </p:grpSpPr>
+      <p:sp>
+        <p:nvSpPr>
+          <p:cNvPr id="2" name="Title 1">
+            <a:extLst>
+              <a:ext uri="{FF2B5EF4-FFF2-40B4-BE49-F238E27FC236}">
+                <a16:creationId xmlns:a16="http://schemas.microsoft.com/office/drawing/2014/main" id="{65BA0F5C-A0B7-605F-D27D-B6C5CE31C850}"/>
+              </a:ext>
+            </a:extLst>
+          </p:cNvPr>
+          <p:cNvSpPr>
+            <a:spLocks noGrp="1"/>
+          </p:cNvSpPr>
+          <p:nvPr>
+            <p:ph type="title"/>
+          </p:nvPr>
+        </p:nvSpPr>
+        <p:spPr/>
+        <p:txBody>
+          <a:bodyPr/>
+          <a:lstStyle/>
+          <a:p>
+            <a:r>
+              <a:rPr lang="en-AU" dirty="0"/>
+              <a:t>Conclusion</a:t>
+            </a:r>
+          </a:p>
+        </p:txBody>
+      </p:sp>
+      <p:sp>
+        <p:nvSpPr>
+          <p:cNvPr id="3" name="Content Placeholder 2">
+            <a:extLst>
+              <a:ext uri="{FF2B5EF4-FFF2-40B4-BE49-F238E27FC236}">
+                <a16:creationId xmlns:a16="http://schemas.microsoft.com/office/drawing/2014/main" id="{C4F8990B-566F-C941-A59F-20287C1B4C83}"/>
+              </a:ext>
+            </a:extLst>
+          </p:cNvPr>
+          <p:cNvSpPr>
+            <a:spLocks noGrp="1"/>
+          </p:cNvSpPr>
+          <p:nvPr>
+            <p:ph idx="1"/>
+          </p:nvPr>
+        </p:nvSpPr>
+        <p:spPr/>
+        <p:txBody>
+          <a:bodyPr/>
+          <a:lstStyle/>
+          <a:p>
+            <a:endParaRPr lang="en-AU"/>
+          </a:p>
+        </p:txBody>
+      </p:sp>
+    </p:spTree>
+    <p:extLst>
+      <p:ext uri="{BB962C8B-B14F-4D97-AF65-F5344CB8AC3E}">
+        <p14:creationId xmlns:p14="http://schemas.microsoft.com/office/powerpoint/2010/main" val="3561853324"/>
       </p:ext>
     </p:extLst>
   </p:cSld>
@@ -6219,6 +6630,260 @@
           <p:cNvPr id="2" name="Title 1">
             <a:extLst>
               <a:ext uri="{FF2B5EF4-FFF2-40B4-BE49-F238E27FC236}">
+                <a16:creationId xmlns:a16="http://schemas.microsoft.com/office/drawing/2014/main" id="{26132F41-B14D-099F-7D60-C71AED44720E}"/>
+              </a:ext>
+            </a:extLst>
+          </p:cNvPr>
+          <p:cNvSpPr>
+            <a:spLocks noGrp="1"/>
+          </p:cNvSpPr>
+          <p:nvPr>
+            <p:ph type="title"/>
+          </p:nvPr>
+        </p:nvSpPr>
+        <p:spPr/>
+        <p:txBody>
+          <a:bodyPr/>
+          <a:lstStyle/>
+          <a:p>
+            <a:r>
+              <a:rPr lang="en-AU" dirty="0"/>
+              <a:t>Eligibility for Housing </a:t>
+            </a:r>
+          </a:p>
+        </p:txBody>
+      </p:sp>
+      <p:sp>
+        <p:nvSpPr>
+          <p:cNvPr id="3" name="Content Placeholder 2">
+            <a:extLst>
+              <a:ext uri="{FF2B5EF4-FFF2-40B4-BE49-F238E27FC236}">
+                <a16:creationId xmlns:a16="http://schemas.microsoft.com/office/drawing/2014/main" id="{C4DBBA71-3A8F-3EF2-1678-45D100E82CB7}"/>
+              </a:ext>
+            </a:extLst>
+          </p:cNvPr>
+          <p:cNvSpPr>
+            <a:spLocks noGrp="1"/>
+          </p:cNvSpPr>
+          <p:nvPr>
+            <p:ph idx="1"/>
+          </p:nvPr>
+        </p:nvSpPr>
+        <p:spPr/>
+        <p:txBody>
+          <a:bodyPr>
+            <a:normAutofit fontScale="25000" lnSpcReduction="20000"/>
+          </a:bodyPr>
+          <a:lstStyle/>
+          <a:p>
+            <a:pPr>
+              <a:lnSpc>
+                <a:spcPct val="127000"/>
+              </a:lnSpc>
+              <a:spcAft>
+                <a:spcPts val="600"/>
+              </a:spcAft>
+            </a:pPr>
+            <a:r>
+              <a:rPr lang="en-AU" sz="7200" dirty="0">
+                <a:solidFill>
+                  <a:srgbClr val="1D1C1D"/>
+                </a:solidFill>
+                <a:latin typeface="Arial" panose="020B0604020202020204" pitchFamily="34" charset="0"/>
+                <a:cs typeface="Times New Roman" panose="02020603050405020304" pitchFamily="18" charset="0"/>
+              </a:rPr>
+              <a:t>1. </a:t>
+            </a:r>
+            <a:r>
+              <a:rPr lang="en-GB" sz="7200" dirty="0">
+                <a:solidFill>
+                  <a:srgbClr val="1D1C1D"/>
+                </a:solidFill>
+                <a:latin typeface="Arial" panose="020B0604020202020204" pitchFamily="34" charset="0"/>
+                <a:cs typeface="Times New Roman" panose="02020603050405020304" pitchFamily="18" charset="0"/>
+              </a:rPr>
+              <a:t>Australian citizenship and residency status</a:t>
+            </a:r>
+          </a:p>
+          <a:p>
+            <a:pPr>
+              <a:lnSpc>
+                <a:spcPct val="127000"/>
+              </a:lnSpc>
+              <a:spcAft>
+                <a:spcPts val="600"/>
+              </a:spcAft>
+            </a:pPr>
+            <a:r>
+              <a:rPr lang="en-AU" sz="7200" dirty="0">
+                <a:solidFill>
+                  <a:srgbClr val="1D1C1D"/>
+                </a:solidFill>
+                <a:latin typeface="Arial" panose="020B0604020202020204" pitchFamily="34" charset="0"/>
+                <a:cs typeface="Times New Roman" panose="02020603050405020304" pitchFamily="18" charset="0"/>
+              </a:rPr>
+              <a:t>2. Queensland residency</a:t>
+            </a:r>
+          </a:p>
+          <a:p>
+            <a:pPr>
+              <a:lnSpc>
+                <a:spcPct val="127000"/>
+              </a:lnSpc>
+              <a:spcAft>
+                <a:spcPts val="600"/>
+              </a:spcAft>
+            </a:pPr>
+            <a:r>
+              <a:rPr lang="en-AU" sz="7200" dirty="0">
+                <a:solidFill>
+                  <a:srgbClr val="1D1C1D"/>
+                </a:solidFill>
+                <a:latin typeface="Arial" panose="020B0604020202020204" pitchFamily="34" charset="0"/>
+                <a:cs typeface="Times New Roman" panose="02020603050405020304" pitchFamily="18" charset="0"/>
+              </a:rPr>
+              <a:t>3. No property ownership </a:t>
+            </a:r>
+          </a:p>
+          <a:p>
+            <a:pPr>
+              <a:lnSpc>
+                <a:spcPct val="127000"/>
+              </a:lnSpc>
+              <a:spcAft>
+                <a:spcPts val="600"/>
+              </a:spcAft>
+            </a:pPr>
+            <a:r>
+              <a:rPr lang="en-AU" sz="7200" dirty="0">
+                <a:solidFill>
+                  <a:srgbClr val="1D1C1D"/>
+                </a:solidFill>
+                <a:latin typeface="Arial" panose="020B0604020202020204" pitchFamily="34" charset="0"/>
+                <a:cs typeface="Times New Roman" panose="02020603050405020304" pitchFamily="18" charset="0"/>
+              </a:rPr>
+              <a:t>4. Liquid asset test (Single – under $117k and 2 or more under $149k) </a:t>
+            </a:r>
+          </a:p>
+          <a:p>
+            <a:pPr>
+              <a:lnSpc>
+                <a:spcPct val="127000"/>
+              </a:lnSpc>
+              <a:spcAft>
+                <a:spcPts val="600"/>
+              </a:spcAft>
+            </a:pPr>
+            <a:r>
+              <a:rPr lang="en-AU" sz="7200" dirty="0">
+                <a:solidFill>
+                  <a:srgbClr val="1D1C1D"/>
+                </a:solidFill>
+                <a:latin typeface="Arial" panose="020B0604020202020204" pitchFamily="34" charset="0"/>
+                <a:cs typeface="Times New Roman" panose="02020603050405020304" pitchFamily="18" charset="0"/>
+              </a:rPr>
+              <a:t>5. Independent Income ( $226.81 per week with proof of min 4 weeks)</a:t>
+            </a:r>
+          </a:p>
+          <a:p>
+            <a:pPr>
+              <a:lnSpc>
+                <a:spcPct val="127000"/>
+              </a:lnSpc>
+              <a:spcAft>
+                <a:spcPts val="600"/>
+              </a:spcAft>
+            </a:pPr>
+            <a:r>
+              <a:rPr lang="en-AU" sz="7200" dirty="0">
+                <a:solidFill>
+                  <a:srgbClr val="1D1C1D"/>
+                </a:solidFill>
+                <a:latin typeface="Arial" panose="020B0604020202020204" pitchFamily="34" charset="0"/>
+                <a:cs typeface="Times New Roman" panose="02020603050405020304" pitchFamily="18" charset="0"/>
+              </a:rPr>
+              <a:t>6. Household income must fall below $609 to $1121 per week ( depending on family size)</a:t>
+            </a:r>
+          </a:p>
+          <a:p>
+            <a:pPr>
+              <a:lnSpc>
+                <a:spcPct val="127000"/>
+              </a:lnSpc>
+              <a:spcAft>
+                <a:spcPts val="600"/>
+              </a:spcAft>
+            </a:pPr>
+            <a:r>
+              <a:rPr lang="en-GB" sz="7200" dirty="0">
+                <a:solidFill>
+                  <a:srgbClr val="1D1C1D"/>
+                </a:solidFill>
+                <a:latin typeface="Arial" panose="020B0604020202020204" pitchFamily="34" charset="0"/>
+                <a:cs typeface="Times New Roman" panose="02020603050405020304" pitchFamily="18" charset="0"/>
+              </a:rPr>
+              <a:t>7. Wellbeing</a:t>
+            </a:r>
+          </a:p>
+          <a:p>
+            <a:endParaRPr lang="en-GB" b="1" i="0" dirty="0">
+              <a:solidFill>
+                <a:srgbClr val="212529"/>
+              </a:solidFill>
+              <a:effectLst/>
+              <a:latin typeface="Lato" panose="020F0502020204030203" pitchFamily="34" charset="0"/>
+            </a:endParaRPr>
+          </a:p>
+          <a:p>
+            <a:r>
+              <a:rPr lang="en-AU" dirty="0"/>
+              <a:t> </a:t>
+            </a:r>
+            <a:r>
+              <a:rPr lang="en-AU" dirty="0">
+                <a:sym typeface="Wingdings" panose="05000000000000000000" pitchFamily="2" charset="2"/>
+              </a:rPr>
+              <a:t> https://www.qld.gov.au/housing/public-community-housing/eligibility-applying-for-housing/eligibility-for-housing/check-your-eligibility</a:t>
+            </a:r>
+            <a:endParaRPr lang="en-AU" dirty="0"/>
+          </a:p>
+        </p:txBody>
+      </p:sp>
+    </p:spTree>
+    <p:extLst>
+      <p:ext uri="{BB962C8B-B14F-4D97-AF65-F5344CB8AC3E}">
+        <p14:creationId xmlns:p14="http://schemas.microsoft.com/office/powerpoint/2010/main" val="1316716995"/>
+      </p:ext>
+    </p:extLst>
+  </p:cSld>
+  <p:clrMapOvr>
+    <a:masterClrMapping/>
+  </p:clrMapOvr>
+</p:sld>
+</file>
+
+<file path=ppt/slides/slide5.xml><?xml version="1.0" encoding="utf-8"?>
+<p:sld xmlns:a="http://schemas.openxmlformats.org/drawingml/2006/main" xmlns:r="http://schemas.openxmlformats.org/officeDocument/2006/relationships" xmlns:p="http://schemas.openxmlformats.org/presentationml/2006/main">
+  <p:cSld>
+    <p:spTree>
+      <p:nvGrpSpPr>
+        <p:cNvPr id="1" name=""/>
+        <p:cNvGrpSpPr/>
+        <p:nvPr/>
+      </p:nvGrpSpPr>
+      <p:grpSpPr>
+        <a:xfrm>
+          <a:off x="0" y="0"/>
+          <a:ext cx="0" cy="0"/>
+          <a:chOff x="0" y="0"/>
+          <a:chExt cx="0" cy="0"/>
+        </a:xfrm>
+      </p:grpSpPr>
+      <p:sp>
+        <p:nvSpPr>
+          <p:cNvPr id="2" name="Title 1">
+            <a:extLst>
+              <a:ext uri="{FF2B5EF4-FFF2-40B4-BE49-F238E27FC236}">
                 <a16:creationId xmlns:a16="http://schemas.microsoft.com/office/drawing/2014/main" id="{6E0F8A29-0E59-62D2-C131-F840BEC04625}"/>
               </a:ext>
             </a:extLst>
@@ -6578,229 +7243,6 @@
 </p:sld>
 </file>
 
-<file path=ppt/slides/slide5.xml><?xml version="1.0" encoding="utf-8"?>
-<p:sld xmlns:a="http://schemas.openxmlformats.org/drawingml/2006/main" xmlns:r="http://schemas.openxmlformats.org/officeDocument/2006/relationships" xmlns:p="http://schemas.openxmlformats.org/presentationml/2006/main">
-  <p:cSld>
-    <p:spTree>
-      <p:nvGrpSpPr>
-        <p:cNvPr id="1" name=""/>
-        <p:cNvGrpSpPr/>
-        <p:nvPr/>
-      </p:nvGrpSpPr>
-      <p:grpSpPr>
-        <a:xfrm>
-          <a:off x="0" y="0"/>
-          <a:ext cx="0" cy="0"/>
-          <a:chOff x="0" y="0"/>
-          <a:chExt cx="0" cy="0"/>
-        </a:xfrm>
-      </p:grpSpPr>
-      <p:sp>
-        <p:nvSpPr>
-          <p:cNvPr id="2" name="Title 1">
-            <a:extLst>
-              <a:ext uri="{FF2B5EF4-FFF2-40B4-BE49-F238E27FC236}">
-                <a16:creationId xmlns:a16="http://schemas.microsoft.com/office/drawing/2014/main" id="{2C5BC6D5-5381-58E6-BCF7-A6645ADFC407}"/>
-              </a:ext>
-            </a:extLst>
-          </p:cNvPr>
-          <p:cNvSpPr>
-            <a:spLocks noGrp="1"/>
-          </p:cNvSpPr>
-          <p:nvPr>
-            <p:ph type="title"/>
-          </p:nvPr>
-        </p:nvSpPr>
-        <p:spPr/>
-        <p:txBody>
-          <a:bodyPr/>
-          <a:lstStyle/>
-          <a:p>
-            <a:r>
-              <a:rPr lang="en-AU" dirty="0"/>
-              <a:t>Project Objectives </a:t>
-            </a:r>
-          </a:p>
-        </p:txBody>
-      </p:sp>
-      <p:sp>
-        <p:nvSpPr>
-          <p:cNvPr id="3" name="Content Placeholder 2">
-            <a:extLst>
-              <a:ext uri="{FF2B5EF4-FFF2-40B4-BE49-F238E27FC236}">
-                <a16:creationId xmlns:a16="http://schemas.microsoft.com/office/drawing/2014/main" id="{05EB99AD-6538-A2B0-D345-FFDF7B46CA6F}"/>
-              </a:ext>
-            </a:extLst>
-          </p:cNvPr>
-          <p:cNvSpPr>
-            <a:spLocks noGrp="1"/>
-          </p:cNvSpPr>
-          <p:nvPr>
-            <p:ph idx="1"/>
-          </p:nvPr>
-        </p:nvSpPr>
-        <p:spPr/>
-        <p:txBody>
-          <a:bodyPr/>
-          <a:lstStyle/>
-          <a:p>
-            <a:pPr>
-              <a:lnSpc>
-                <a:spcPct val="107000"/>
-              </a:lnSpc>
-              <a:spcAft>
-                <a:spcPts val="600"/>
-              </a:spcAft>
-            </a:pPr>
-            <a:r>
-              <a:rPr lang="en-AU" sz="1800" dirty="0">
-                <a:solidFill>
-                  <a:srgbClr val="1D1C1D"/>
-                </a:solidFill>
-                <a:effectLst/>
-                <a:latin typeface="Arial" panose="020B0604020202020204" pitchFamily="34" charset="0"/>
-                <a:ea typeface="Times New Roman" panose="02020603050405020304" pitchFamily="18" charset="0"/>
-                <a:cs typeface="Times New Roman" panose="02020603050405020304" pitchFamily="18" charset="0"/>
-              </a:rPr>
-              <a:t>(1) How vacancy rate changes over the year?</a:t>
-            </a:r>
-            <a:endParaRPr lang="en-AU" sz="1800" dirty="0">
-              <a:effectLst/>
-              <a:latin typeface="Calibri" panose="020F0502020204030204" pitchFamily="34" charset="0"/>
-              <a:ea typeface="Calibri" panose="020F0502020204030204" pitchFamily="34" charset="0"/>
-              <a:cs typeface="Times New Roman" panose="02020603050405020304" pitchFamily="18" charset="0"/>
-            </a:endParaRPr>
-          </a:p>
-          <a:p>
-            <a:pPr>
-              <a:lnSpc>
-                <a:spcPct val="107000"/>
-              </a:lnSpc>
-              <a:spcAft>
-                <a:spcPts val="600"/>
-              </a:spcAft>
-            </a:pPr>
-            <a:r>
-              <a:rPr lang="en-AU" sz="1800" dirty="0">
-                <a:solidFill>
-                  <a:srgbClr val="1D1C1D"/>
-                </a:solidFill>
-                <a:effectLst/>
-                <a:latin typeface="Arial" panose="020B0604020202020204" pitchFamily="34" charset="0"/>
-                <a:ea typeface="Times New Roman" panose="02020603050405020304" pitchFamily="18" charset="0"/>
-                <a:cs typeface="Times New Roman" panose="02020603050405020304" pitchFamily="18" charset="0"/>
-              </a:rPr>
-              <a:t>(2) How dwelling type effect Vacancy rates?</a:t>
-            </a:r>
-            <a:endParaRPr lang="en-AU" sz="1800" dirty="0">
-              <a:effectLst/>
-              <a:latin typeface="Calibri" panose="020F0502020204030204" pitchFamily="34" charset="0"/>
-              <a:ea typeface="Calibri" panose="020F0502020204030204" pitchFamily="34" charset="0"/>
-              <a:cs typeface="Times New Roman" panose="02020603050405020304" pitchFamily="18" charset="0"/>
-            </a:endParaRPr>
-          </a:p>
-          <a:p>
-            <a:pPr>
-              <a:lnSpc>
-                <a:spcPct val="107000"/>
-              </a:lnSpc>
-              <a:spcAft>
-                <a:spcPts val="600"/>
-              </a:spcAft>
-            </a:pPr>
-            <a:r>
-              <a:rPr lang="en-AU" sz="1800" dirty="0">
-                <a:solidFill>
-                  <a:srgbClr val="1D1C1D"/>
-                </a:solidFill>
-                <a:effectLst/>
-                <a:latin typeface="Arial" panose="020B0604020202020204" pitchFamily="34" charset="0"/>
-                <a:ea typeface="Times New Roman" panose="02020603050405020304" pitchFamily="18" charset="0"/>
-                <a:cs typeface="Times New Roman" panose="02020603050405020304" pitchFamily="18" charset="0"/>
-              </a:rPr>
-              <a:t>(3) How Vacancy rate effected by Geography?</a:t>
-            </a:r>
-            <a:endParaRPr lang="en-AU" sz="1800" dirty="0">
-              <a:effectLst/>
-              <a:latin typeface="Calibri" panose="020F0502020204030204" pitchFamily="34" charset="0"/>
-              <a:ea typeface="Calibri" panose="020F0502020204030204" pitchFamily="34" charset="0"/>
-              <a:cs typeface="Times New Roman" panose="02020603050405020304" pitchFamily="18" charset="0"/>
-            </a:endParaRPr>
-          </a:p>
-          <a:p>
-            <a:pPr>
-              <a:lnSpc>
-                <a:spcPct val="107000"/>
-              </a:lnSpc>
-              <a:spcAft>
-                <a:spcPts val="600"/>
-              </a:spcAft>
-            </a:pPr>
-            <a:r>
-              <a:rPr lang="en-AU" sz="1800" dirty="0">
-                <a:solidFill>
-                  <a:srgbClr val="1D1C1D"/>
-                </a:solidFill>
-                <a:effectLst/>
-                <a:latin typeface="Arial" panose="020B0604020202020204" pitchFamily="34" charset="0"/>
-                <a:ea typeface="Times New Roman" panose="02020603050405020304" pitchFamily="18" charset="0"/>
-                <a:cs typeface="Times New Roman" panose="02020603050405020304" pitchFamily="18" charset="0"/>
-              </a:rPr>
-              <a:t>(4) How vacancy rate varied by social housing program?</a:t>
-            </a:r>
-            <a:endParaRPr lang="en-AU" sz="1800" dirty="0">
-              <a:effectLst/>
-              <a:latin typeface="Calibri" panose="020F0502020204030204" pitchFamily="34" charset="0"/>
-              <a:ea typeface="Calibri" panose="020F0502020204030204" pitchFamily="34" charset="0"/>
-              <a:cs typeface="Times New Roman" panose="02020603050405020304" pitchFamily="18" charset="0"/>
-            </a:endParaRPr>
-          </a:p>
-          <a:p>
-            <a:pPr>
-              <a:lnSpc>
-                <a:spcPct val="107000"/>
-              </a:lnSpc>
-              <a:spcAft>
-                <a:spcPts val="600"/>
-              </a:spcAft>
-            </a:pPr>
-            <a:r>
-              <a:rPr lang="en-AU" sz="1800" dirty="0">
-                <a:solidFill>
-                  <a:srgbClr val="1D1C1D"/>
-                </a:solidFill>
-                <a:effectLst/>
-                <a:latin typeface="Arial" panose="020B0604020202020204" pitchFamily="34" charset="0"/>
-                <a:ea typeface="Times New Roman" panose="02020603050405020304" pitchFamily="18" charset="0"/>
-                <a:cs typeface="Times New Roman" panose="02020603050405020304" pitchFamily="18" charset="0"/>
-              </a:rPr>
-              <a:t>(5) Were vacancy days Tenantable or Untenantable? </a:t>
-            </a:r>
-            <a:endParaRPr lang="en-AU" sz="1800" dirty="0">
-              <a:effectLst/>
-              <a:latin typeface="Calibri" panose="020F0502020204030204" pitchFamily="34" charset="0"/>
-              <a:ea typeface="Calibri" panose="020F0502020204030204" pitchFamily="34" charset="0"/>
-              <a:cs typeface="Times New Roman" panose="02020603050405020304" pitchFamily="18" charset="0"/>
-            </a:endParaRPr>
-          </a:p>
-          <a:p>
-            <a:endParaRPr lang="en-AU" dirty="0"/>
-          </a:p>
-        </p:txBody>
-      </p:sp>
-    </p:spTree>
-    <p:extLst>
-      <p:ext uri="{BB962C8B-B14F-4D97-AF65-F5344CB8AC3E}">
-        <p14:creationId xmlns:p14="http://schemas.microsoft.com/office/powerpoint/2010/main" val="103262496"/>
-      </p:ext>
-    </p:extLst>
-  </p:cSld>
-  <p:clrMapOvr>
-    <a:masterClrMapping/>
-  </p:clrMapOvr>
-</p:sld>
-</file>
-
 <file path=ppt/slides/slide6.xml><?xml version="1.0" encoding="utf-8"?>
 <p:sld xmlns:a="http://schemas.openxmlformats.org/drawingml/2006/main" xmlns:r="http://schemas.openxmlformats.org/officeDocument/2006/relationships" xmlns:p="http://schemas.openxmlformats.org/presentationml/2006/main">
   <p:cSld>
@@ -6820,10 +7262,10 @@
       </p:grpSpPr>
       <p:sp>
         <p:nvSpPr>
-          <p:cNvPr id="4" name="Title 3">
+          <p:cNvPr id="2" name="Title 1">
             <a:extLst>
               <a:ext uri="{FF2B5EF4-FFF2-40B4-BE49-F238E27FC236}">
-                <a16:creationId xmlns:a16="http://schemas.microsoft.com/office/drawing/2014/main" id="{20C05956-8EE2-7A6C-2FED-857B51FDB7B4}"/>
+                <a16:creationId xmlns:a16="http://schemas.microsoft.com/office/drawing/2014/main" id="{1D256A19-F5EE-0E5B-F782-548A518CD04D}"/>
               </a:ext>
             </a:extLst>
           </p:cNvPr>
@@ -6841,17 +7283,17 @@
           <a:p>
             <a:r>
               <a:rPr lang="en-AU" dirty="0"/>
-              <a:t>Average Vacancy Days by Year </a:t>
-            </a:r>
-          </a:p>
-        </p:txBody>
-      </p:sp>
-      <p:sp>
-        <p:nvSpPr>
-          <p:cNvPr id="5" name="Content Placeholder 4">
+              <a:t>Size of Dwelling </a:t>
+            </a:r>
+          </a:p>
+        </p:txBody>
+      </p:sp>
+      <p:sp>
+        <p:nvSpPr>
+          <p:cNvPr id="3" name="Content Placeholder 2">
             <a:extLst>
               <a:ext uri="{FF2B5EF4-FFF2-40B4-BE49-F238E27FC236}">
-                <a16:creationId xmlns:a16="http://schemas.microsoft.com/office/drawing/2014/main" id="{BDE7EA8F-83FE-7E55-3059-04BF9A06C59A}"/>
+                <a16:creationId xmlns:a16="http://schemas.microsoft.com/office/drawing/2014/main" id="{6105589C-1951-C196-84D8-5991078327B9}"/>
               </a:ext>
             </a:extLst>
           </p:cNvPr>
@@ -6859,15 +7301,10 @@
             <a:spLocks noGrp="1"/>
           </p:cNvSpPr>
           <p:nvPr>
-            <p:ph sz="half" idx="1"/>
-          </p:nvPr>
-        </p:nvSpPr>
-        <p:spPr>
-          <a:xfrm>
-            <a:off x="6126480" y="2214693"/>
-            <a:ext cx="4639736" cy="3748193"/>
-          </a:xfrm>
-        </p:spPr>
+            <p:ph idx="1"/>
+          </p:nvPr>
+        </p:nvSpPr>
+        <p:spPr/>
         <p:txBody>
           <a:bodyPr/>
           <a:lstStyle/>
@@ -6876,39 +7313,10 @@
           </a:p>
         </p:txBody>
       </p:sp>
-      <p:pic>
-        <p:nvPicPr>
-          <p:cNvPr id="10" name="Content Placeholder 9">
-            <a:extLst>
-              <a:ext uri="{FF2B5EF4-FFF2-40B4-BE49-F238E27FC236}">
-                <a16:creationId xmlns:a16="http://schemas.microsoft.com/office/drawing/2014/main" id="{3E32A1E4-7626-7D58-923F-D27A7399E690}"/>
-              </a:ext>
-            </a:extLst>
-          </p:cNvPr>
-          <p:cNvPicPr>
-            <a:picLocks noGrp="1" noChangeAspect="1"/>
-          </p:cNvPicPr>
-          <p:nvPr>
-            <p:ph sz="half" idx="2"/>
-          </p:nvPr>
-        </p:nvPicPr>
-        <p:blipFill>
-          <a:blip r:embed="rId2"/>
-          <a:stretch>
-            <a:fillRect/>
-          </a:stretch>
-        </p:blipFill>
-        <p:spPr>
-          <a:xfrm>
-            <a:off x="1097280" y="2214693"/>
-            <a:ext cx="4733917" cy="3233733"/>
-          </a:xfrm>
-        </p:spPr>
-      </p:pic>
     </p:spTree>
     <p:extLst>
       <p:ext uri="{BB962C8B-B14F-4D97-AF65-F5344CB8AC3E}">
-        <p14:creationId xmlns:p14="http://schemas.microsoft.com/office/powerpoint/2010/main" val="1001600222"/>
+        <p14:creationId xmlns:p14="http://schemas.microsoft.com/office/powerpoint/2010/main" val="2010793377"/>
       </p:ext>
     </p:extLst>
   </p:cSld>
@@ -6937,10 +7345,10 @@
       </p:grpSpPr>
       <p:sp>
         <p:nvSpPr>
-          <p:cNvPr id="4" name="Title 3">
+          <p:cNvPr id="2" name="Title 1">
             <a:extLst>
               <a:ext uri="{FF2B5EF4-FFF2-40B4-BE49-F238E27FC236}">
-                <a16:creationId xmlns:a16="http://schemas.microsoft.com/office/drawing/2014/main" id="{955E3AC9-AA37-8A8D-E2E0-325745B7589C}"/>
+                <a16:creationId xmlns:a16="http://schemas.microsoft.com/office/drawing/2014/main" id="{2C5BC6D5-5381-58E6-BCF7-A6645ADFC407}"/>
               </a:ext>
             </a:extLst>
           </p:cNvPr>
@@ -6958,17 +7366,17 @@
           <a:p>
             <a:r>
               <a:rPr lang="en-AU" dirty="0"/>
-              <a:t>Untenable and Tenable Vacancy Days by Year </a:t>
-            </a:r>
-          </a:p>
-        </p:txBody>
-      </p:sp>
-      <p:sp>
-        <p:nvSpPr>
-          <p:cNvPr id="5" name="Content Placeholder 4">
+              <a:t>Project Objectives </a:t>
+            </a:r>
+          </a:p>
+        </p:txBody>
+      </p:sp>
+      <p:sp>
+        <p:nvSpPr>
+          <p:cNvPr id="3" name="Content Placeholder 2">
             <a:extLst>
               <a:ext uri="{FF2B5EF4-FFF2-40B4-BE49-F238E27FC236}">
-                <a16:creationId xmlns:a16="http://schemas.microsoft.com/office/drawing/2014/main" id="{BAFBAFEF-860A-B60F-F016-5910531A5F97}"/>
+                <a16:creationId xmlns:a16="http://schemas.microsoft.com/office/drawing/2014/main" id="{05EB99AD-6538-A2B0-D345-FFDF7B46CA6F}"/>
               </a:ext>
             </a:extLst>
           </p:cNvPr>
@@ -6976,56 +7384,178 @@
             <a:spLocks noGrp="1"/>
           </p:cNvSpPr>
           <p:nvPr>
-            <p:ph sz="half" idx="1"/>
-          </p:nvPr>
-        </p:nvSpPr>
-        <p:spPr>
-          <a:xfrm>
-            <a:off x="6515944" y="2350803"/>
-            <a:ext cx="4639736" cy="3748193"/>
-          </a:xfrm>
-        </p:spPr>
-        <p:txBody>
-          <a:bodyPr/>
+            <p:ph idx="1"/>
+          </p:nvPr>
+        </p:nvSpPr>
+        <p:spPr/>
+        <p:txBody>
+          <a:bodyPr>
+            <a:normAutofit/>
+          </a:bodyPr>
           <a:lstStyle/>
           <a:p>
+            <a:pPr>
+              <a:lnSpc>
+                <a:spcPct val="107000"/>
+              </a:lnSpc>
+              <a:spcAft>
+                <a:spcPts val="600"/>
+              </a:spcAft>
+            </a:pPr>
+            <a:r>
+              <a:rPr lang="en-AU" sz="1800" dirty="0">
+                <a:solidFill>
+                  <a:srgbClr val="1D1C1D"/>
+                </a:solidFill>
+                <a:effectLst/>
+                <a:latin typeface="Arial" panose="020B0604020202020204" pitchFamily="34" charset="0"/>
+                <a:ea typeface="Times New Roman" panose="02020603050405020304" pitchFamily="18" charset="0"/>
+                <a:cs typeface="Times New Roman" panose="02020603050405020304" pitchFamily="18" charset="0"/>
+              </a:rPr>
+              <a:t>(1) What are the vacant days across 5 year period in QLD housing sector?  (Graph 1)</a:t>
+            </a:r>
+          </a:p>
+          <a:p>
+            <a:pPr>
+              <a:lnSpc>
+                <a:spcPct val="107000"/>
+              </a:lnSpc>
+              <a:spcAft>
+                <a:spcPts val="600"/>
+              </a:spcAft>
+            </a:pPr>
+            <a:r>
+              <a:rPr lang="en-AU" sz="1800" dirty="0">
+                <a:solidFill>
+                  <a:srgbClr val="1D1C1D"/>
+                </a:solidFill>
+                <a:latin typeface="Arial" panose="020B0604020202020204" pitchFamily="34" charset="0"/>
+                <a:ea typeface="Calibri" panose="020F0502020204030204" pitchFamily="34" charset="0"/>
+                <a:cs typeface="Times New Roman" panose="02020603050405020304" pitchFamily="18" charset="0"/>
+              </a:rPr>
+              <a:t>(2) </a:t>
+            </a:r>
+            <a:r>
+              <a:rPr lang="en-AU" sz="1800" dirty="0">
+                <a:solidFill>
+                  <a:srgbClr val="1D1C1D"/>
+                </a:solidFill>
+                <a:effectLst/>
+                <a:latin typeface="Arial" panose="020B0604020202020204" pitchFamily="34" charset="0"/>
+                <a:ea typeface="Times New Roman" panose="02020603050405020304" pitchFamily="18" charset="0"/>
+                <a:cs typeface="Times New Roman" panose="02020603050405020304" pitchFamily="18" charset="0"/>
+              </a:rPr>
+              <a:t>What was the status of the dwelling during vacant days (tenantable and untenable)? (Graph 2)</a:t>
+            </a:r>
+          </a:p>
+          <a:p>
+            <a:pPr>
+              <a:lnSpc>
+                <a:spcPct val="107000"/>
+              </a:lnSpc>
+              <a:spcAft>
+                <a:spcPts val="600"/>
+              </a:spcAft>
+            </a:pPr>
+            <a:r>
+              <a:rPr lang="en-AU" sz="1800" dirty="0">
+                <a:solidFill>
+                  <a:srgbClr val="1D1C1D"/>
+                </a:solidFill>
+                <a:effectLst/>
+                <a:latin typeface="Arial" panose="020B0604020202020204" pitchFamily="34" charset="0"/>
+                <a:ea typeface="Times New Roman" panose="02020603050405020304" pitchFamily="18" charset="0"/>
+                <a:cs typeface="Times New Roman" panose="02020603050405020304" pitchFamily="18" charset="0"/>
+              </a:rPr>
+              <a:t>(3) How does unit size affect vacancy days? (Graph 3 )</a:t>
+            </a:r>
+          </a:p>
+          <a:p>
+            <a:pPr>
+              <a:lnSpc>
+                <a:spcPct val="107000"/>
+              </a:lnSpc>
+              <a:spcAft>
+                <a:spcPts val="600"/>
+              </a:spcAft>
+            </a:pPr>
+            <a:r>
+              <a:rPr lang="en-AU" sz="1800" dirty="0">
+                <a:solidFill>
+                  <a:srgbClr val="1D1C1D"/>
+                </a:solidFill>
+                <a:effectLst/>
+                <a:latin typeface="Arial" panose="020B0604020202020204" pitchFamily="34" charset="0"/>
+                <a:ea typeface="Times New Roman" panose="02020603050405020304" pitchFamily="18" charset="0"/>
+                <a:cs typeface="Times New Roman" panose="02020603050405020304" pitchFamily="18" charset="0"/>
+              </a:rPr>
+              <a:t>(4) How does dwelling type affects the vacancy days? (Graph 4 to 6)</a:t>
+            </a:r>
+            <a:endParaRPr lang="en-AU" sz="1800" dirty="0">
+              <a:effectLst/>
+              <a:latin typeface="Calibri" panose="020F0502020204030204" pitchFamily="34" charset="0"/>
+              <a:ea typeface="Calibri" panose="020F0502020204030204" pitchFamily="34" charset="0"/>
+              <a:cs typeface="Times New Roman" panose="02020603050405020304" pitchFamily="18" charset="0"/>
+            </a:endParaRPr>
+          </a:p>
+          <a:p>
+            <a:pPr marL="0" indent="0">
+              <a:lnSpc>
+                <a:spcPct val="107000"/>
+              </a:lnSpc>
+              <a:spcAft>
+                <a:spcPts val="600"/>
+              </a:spcAft>
+              <a:buNone/>
+            </a:pPr>
+            <a:r>
+              <a:rPr lang="en-AU" sz="1800" dirty="0">
+                <a:latin typeface="Calibri" panose="020F0502020204030204" pitchFamily="34" charset="0"/>
+                <a:ea typeface="Times New Roman" panose="02020603050405020304" pitchFamily="18" charset="0"/>
+                <a:cs typeface="Times New Roman" panose="02020603050405020304" pitchFamily="18" charset="0"/>
+              </a:rPr>
+              <a:t>  </a:t>
+            </a:r>
+            <a:r>
+              <a:rPr lang="en-AU" sz="1800" dirty="0">
+                <a:solidFill>
+                  <a:srgbClr val="1D1C1D"/>
+                </a:solidFill>
+                <a:effectLst/>
+                <a:latin typeface="Arial" panose="020B0604020202020204" pitchFamily="34" charset="0"/>
+                <a:ea typeface="Times New Roman" panose="02020603050405020304" pitchFamily="18" charset="0"/>
+                <a:cs typeface="Times New Roman" panose="02020603050405020304" pitchFamily="18" charset="0"/>
+              </a:rPr>
+              <a:t>(5) Are there any factors that affected the vacancy days trend? </a:t>
+            </a:r>
+          </a:p>
+          <a:p>
+            <a:pPr>
+              <a:lnSpc>
+                <a:spcPct val="107000"/>
+              </a:lnSpc>
+              <a:spcAft>
+                <a:spcPts val="600"/>
+              </a:spcAft>
+            </a:pPr>
+            <a:r>
+              <a:rPr lang="en-AU" sz="1800" dirty="0">
+                <a:solidFill>
+                  <a:srgbClr val="1D1C1D"/>
+                </a:solidFill>
+                <a:latin typeface="Arial" panose="020B0604020202020204" pitchFamily="34" charset="0"/>
+                <a:cs typeface="Times New Roman" panose="02020603050405020304" pitchFamily="18" charset="0"/>
+              </a:rPr>
+              <a:t>Null Hypothesis: </a:t>
+            </a:r>
             <a:endParaRPr lang="en-AU" dirty="0"/>
           </a:p>
         </p:txBody>
       </p:sp>
-      <p:pic>
-        <p:nvPicPr>
-          <p:cNvPr id="8" name="Content Placeholder 7">
-            <a:extLst>
-              <a:ext uri="{FF2B5EF4-FFF2-40B4-BE49-F238E27FC236}">
-                <a16:creationId xmlns:a16="http://schemas.microsoft.com/office/drawing/2014/main" id="{74EAC48B-A132-C38D-5638-821BE32187E4}"/>
-              </a:ext>
-            </a:extLst>
-          </p:cNvPr>
-          <p:cNvPicPr>
-            <a:picLocks noGrp="1" noChangeAspect="1"/>
-          </p:cNvPicPr>
-          <p:nvPr>
-            <p:ph sz="half" idx="2"/>
-          </p:nvPr>
-        </p:nvPicPr>
-        <p:blipFill>
-          <a:blip r:embed="rId2"/>
-          <a:stretch>
-            <a:fillRect/>
-          </a:stretch>
-        </p:blipFill>
-        <p:spPr>
-          <a:xfrm>
-            <a:off x="889233" y="2350803"/>
-            <a:ext cx="5025006" cy="3477900"/>
-          </a:xfrm>
-        </p:spPr>
-      </p:pic>
     </p:spTree>
     <p:extLst>
       <p:ext uri="{BB962C8B-B14F-4D97-AF65-F5344CB8AC3E}">
-        <p14:creationId xmlns:p14="http://schemas.microsoft.com/office/powerpoint/2010/main" val="2733872368"/>
+        <p14:creationId xmlns:p14="http://schemas.microsoft.com/office/powerpoint/2010/main" val="103262496"/>
       </p:ext>
     </p:extLst>
   </p:cSld>
@@ -7054,10 +7584,10 @@
       </p:grpSpPr>
       <p:sp>
         <p:nvSpPr>
-          <p:cNvPr id="28" name="Title 27">
+          <p:cNvPr id="2" name="Title 1">
             <a:extLst>
               <a:ext uri="{FF2B5EF4-FFF2-40B4-BE49-F238E27FC236}">
-                <a16:creationId xmlns:a16="http://schemas.microsoft.com/office/drawing/2014/main" id="{E32E661E-E47C-ED91-4665-61B7C9A3D112}"/>
+                <a16:creationId xmlns:a16="http://schemas.microsoft.com/office/drawing/2014/main" id="{6970517A-6A38-7EB1-5254-B8F132C4FEFE}"/>
               </a:ext>
             </a:extLst>
           </p:cNvPr>
@@ -7075,45 +7605,40 @@
           <a:p>
             <a:r>
               <a:rPr lang="en-AU" dirty="0"/>
-              <a:t>Vacancy Count by Year-Month</a:t>
-            </a:r>
-          </a:p>
-        </p:txBody>
-      </p:sp>
-      <p:pic>
-        <p:nvPicPr>
-          <p:cNvPr id="32" name="Picture 31">
+              <a:t>Data Analysis </a:t>
+            </a:r>
+          </a:p>
+        </p:txBody>
+      </p:sp>
+      <p:sp>
+        <p:nvSpPr>
+          <p:cNvPr id="3" name="Content Placeholder 2">
             <a:extLst>
               <a:ext uri="{FF2B5EF4-FFF2-40B4-BE49-F238E27FC236}">
-                <a16:creationId xmlns:a16="http://schemas.microsoft.com/office/drawing/2014/main" id="{DDA61A6F-A4EB-CE8D-2D23-AA5732328DC5}"/>
+                <a16:creationId xmlns:a16="http://schemas.microsoft.com/office/drawing/2014/main" id="{C14F8C50-1E5D-0988-993B-EFB333E85D8F}"/>
               </a:ext>
             </a:extLst>
           </p:cNvPr>
-          <p:cNvPicPr>
-            <a:picLocks noChangeAspect="1"/>
-          </p:cNvPicPr>
-          <p:nvPr/>
-        </p:nvPicPr>
-        <p:blipFill>
-          <a:blip r:embed="rId2"/>
-          <a:stretch>
-            <a:fillRect/>
-          </a:stretch>
-        </p:blipFill>
-        <p:spPr>
-          <a:xfrm>
-            <a:off x="1097280" y="2072080"/>
-            <a:ext cx="9639518" cy="3873791"/>
-          </a:xfrm>
-          <a:prstGeom prst="rect">
-            <a:avLst/>
-          </a:prstGeom>
-        </p:spPr>
-      </p:pic>
+          <p:cNvSpPr>
+            <a:spLocks noGrp="1"/>
+          </p:cNvSpPr>
+          <p:nvPr>
+            <p:ph idx="1"/>
+          </p:nvPr>
+        </p:nvSpPr>
+        <p:spPr/>
+        <p:txBody>
+          <a:bodyPr/>
+          <a:lstStyle/>
+          <a:p>
+            <a:endParaRPr lang="en-AU"/>
+          </a:p>
+        </p:txBody>
+      </p:sp>
     </p:spTree>
     <p:extLst>
       <p:ext uri="{BB962C8B-B14F-4D97-AF65-F5344CB8AC3E}">
-        <p14:creationId xmlns:p14="http://schemas.microsoft.com/office/powerpoint/2010/main" val="3383984004"/>
+        <p14:creationId xmlns:p14="http://schemas.microsoft.com/office/powerpoint/2010/main" val="2389115137"/>
       </p:ext>
     </p:extLst>
   </p:cSld>
@@ -7142,10 +7667,10 @@
       </p:grpSpPr>
       <p:sp>
         <p:nvSpPr>
-          <p:cNvPr id="2" name="Title 1">
+          <p:cNvPr id="4" name="Title 3">
             <a:extLst>
               <a:ext uri="{FF2B5EF4-FFF2-40B4-BE49-F238E27FC236}">
-                <a16:creationId xmlns:a16="http://schemas.microsoft.com/office/drawing/2014/main" id="{5CEC80D2-B18E-0C86-2C81-9802FCDEFC46}"/>
+                <a16:creationId xmlns:a16="http://schemas.microsoft.com/office/drawing/2014/main" id="{20C05956-8EE2-7A6C-2FED-857B51FDB7B4}"/>
               </a:ext>
             </a:extLst>
           </p:cNvPr>
@@ -7163,15 +7688,77 @@
           <a:p>
             <a:r>
               <a:rPr lang="en-AU" dirty="0"/>
-              <a:t>Affects of Housing from Covid</a:t>
-            </a:r>
-          </a:p>
-        </p:txBody>
-      </p:sp>
+              <a:t>Average Vacancy Days by Year </a:t>
+            </a:r>
+          </a:p>
+        </p:txBody>
+      </p:sp>
+      <p:sp>
+        <p:nvSpPr>
+          <p:cNvPr id="5" name="Content Placeholder 4">
+            <a:extLst>
+              <a:ext uri="{FF2B5EF4-FFF2-40B4-BE49-F238E27FC236}">
+                <a16:creationId xmlns:a16="http://schemas.microsoft.com/office/drawing/2014/main" id="{BDE7EA8F-83FE-7E55-3059-04BF9A06C59A}"/>
+              </a:ext>
+            </a:extLst>
+          </p:cNvPr>
+          <p:cNvSpPr>
+            <a:spLocks noGrp="1"/>
+          </p:cNvSpPr>
+          <p:nvPr>
+            <p:ph sz="half" idx="1"/>
+          </p:nvPr>
+        </p:nvSpPr>
+        <p:spPr>
+          <a:xfrm>
+            <a:off x="6126480" y="2214693"/>
+            <a:ext cx="4639736" cy="3748193"/>
+          </a:xfrm>
+        </p:spPr>
+        <p:txBody>
+          <a:bodyPr/>
+          <a:lstStyle/>
+          <a:p>
+            <a:r>
+              <a:rPr lang="en-AU" dirty="0"/>
+              <a:t>- </a:t>
+            </a:r>
+          </a:p>
+        </p:txBody>
+      </p:sp>
+      <p:pic>
+        <p:nvPicPr>
+          <p:cNvPr id="10" name="Content Placeholder 9">
+            <a:extLst>
+              <a:ext uri="{FF2B5EF4-FFF2-40B4-BE49-F238E27FC236}">
+                <a16:creationId xmlns:a16="http://schemas.microsoft.com/office/drawing/2014/main" id="{3E32A1E4-7626-7D58-923F-D27A7399E690}"/>
+              </a:ext>
+            </a:extLst>
+          </p:cNvPr>
+          <p:cNvPicPr>
+            <a:picLocks noGrp="1" noChangeAspect="1"/>
+          </p:cNvPicPr>
+          <p:nvPr>
+            <p:ph sz="half" idx="2"/>
+          </p:nvPr>
+        </p:nvPicPr>
+        <p:blipFill>
+          <a:blip r:embed="rId2"/>
+          <a:stretch>
+            <a:fillRect/>
+          </a:stretch>
+        </p:blipFill>
+        <p:spPr>
+          <a:xfrm>
+            <a:off x="1097280" y="2214693"/>
+            <a:ext cx="4733917" cy="3233733"/>
+          </a:xfrm>
+        </p:spPr>
+      </p:pic>
     </p:spTree>
     <p:extLst>
       <p:ext uri="{BB962C8B-B14F-4D97-AF65-F5344CB8AC3E}">
-        <p14:creationId xmlns:p14="http://schemas.microsoft.com/office/powerpoint/2010/main" val="3808628806"/>
+        <p14:creationId xmlns:p14="http://schemas.microsoft.com/office/powerpoint/2010/main" val="1001600222"/>
       </p:ext>
     </p:extLst>
   </p:cSld>
@@ -7551,6 +8138,15 @@
 </file>
 
 <file path=customXml/item1.xml><?xml version="1.0" encoding="utf-8"?>
+<?mso-contentType ?>
+<FormTemplates xmlns="http://schemas.microsoft.com/sharepoint/v3/contenttype/forms">
+  <Display>DocumentLibraryForm</Display>
+  <Edit>DocumentLibraryForm</Edit>
+  <New>DocumentLibraryForm</New>
+</FormTemplates>
+</file>
+
+<file path=customXml/item2.xml><?xml version="1.0" encoding="utf-8"?>
 <ct:contentTypeSchema xmlns:ct="http://schemas.microsoft.com/office/2006/metadata/contentType" xmlns:ma="http://schemas.microsoft.com/office/2006/metadata/properties/metaAttributes" ct:_="" ma:_="" ma:contentTypeName="Document" ma:contentTypeID="0x01010079F111ED35F8CC479449609E8A0923A6" ma:contentTypeVersion="12" ma:contentTypeDescription="Create a new document." ma:contentTypeScope="" ma:versionID="a410dd7f93c95333ffa1b60ed6adedd1">
   <xsd:schema xmlns:xsd="http://www.w3.org/2001/XMLSchema" xmlns:xs="http://www.w3.org/2001/XMLSchema" xmlns:p="http://schemas.microsoft.com/office/2006/metadata/properties" xmlns:ns2="71af3243-3dd4-4a8d-8c0d-dd76da1f02a5" xmlns:ns3="16c05727-aa75-4e4a-9b5f-8a80a1165891" targetNamespace="http://schemas.microsoft.com/office/2006/metadata/properties" ma:root="true" ma:fieldsID="a936d9baba76aa3866493feff160faab" ns2:_="" ns3:_="">
     <xsd:import namespace="71af3243-3dd4-4a8d-8c0d-dd76da1f02a5"/>
@@ -7771,15 +8367,6 @@
 </ct:contentTypeSchema>
 </file>
 
-<file path=customXml/item2.xml><?xml version="1.0" encoding="utf-8"?>
-<?mso-contentType ?>
-<FormTemplates xmlns="http://schemas.microsoft.com/sharepoint/v3/contenttype/forms">
-  <Display>DocumentLibraryForm</Display>
-  <Edit>DocumentLibraryForm</Edit>
-  <New>DocumentLibraryForm</New>
-</FormTemplates>
-</file>
-
 <file path=customXml/item3.xml><?xml version="1.0" encoding="utf-8"?>
 <p:properties xmlns:p="http://schemas.microsoft.com/office/2006/metadata/properties" xmlns:xsi="http://www.w3.org/2001/XMLSchema-instance" xmlns:pc="http://schemas.microsoft.com/office/infopath/2007/PartnerControls">
   <documentManagement>
@@ -7790,6 +8377,14 @@
 </file>
 
 <file path=customXml/itemProps1.xml><?xml version="1.0" encoding="utf-8"?>
+<ds:datastoreItem xmlns:ds="http://schemas.openxmlformats.org/officeDocument/2006/customXml" ds:itemID="{AA3F7EDC-E5B4-4BBC-9D2A-CBE6D46C37AD}">
+  <ds:schemaRefs>
+    <ds:schemaRef ds:uri="http://schemas.microsoft.com/sharepoint/v3/contenttype/forms"/>
+  </ds:schemaRefs>
+</ds:datastoreItem>
+</file>
+
+<file path=customXml/itemProps2.xml><?xml version="1.0" encoding="utf-8"?>
 <ds:datastoreItem xmlns:ds="http://schemas.openxmlformats.org/officeDocument/2006/customXml" ds:itemID="{93932EF5-314F-409E-8020-FEE5FA0795B9}">
   <ds:schemaRefs>
     <ds:schemaRef ds:uri="http://schemas.microsoft.com/office/2006/metadata/contentType"/>
@@ -7808,14 +8403,6 @@
 </ds:datastoreItem>
 </file>
 
-<file path=customXml/itemProps2.xml><?xml version="1.0" encoding="utf-8"?>
-<ds:datastoreItem xmlns:ds="http://schemas.openxmlformats.org/officeDocument/2006/customXml" ds:itemID="{AA3F7EDC-E5B4-4BBC-9D2A-CBE6D46C37AD}">
-  <ds:schemaRefs>
-    <ds:schemaRef ds:uri="http://schemas.microsoft.com/sharepoint/v3/contenttype/forms"/>
-  </ds:schemaRefs>
-</ds:datastoreItem>
-</file>
-
 <file path=customXml/itemProps3.xml><?xml version="1.0" encoding="utf-8"?>
 <ds:datastoreItem xmlns:ds="http://schemas.openxmlformats.org/officeDocument/2006/customXml" ds:itemID="{A03EEFF0-FB57-4CB4-8BFC-DF397689E2ED}">
   <ds:schemaRefs>

</xml_diff>

<commit_message>
Create seperate Data cleanup and Analysis file
</commit_message>
<xml_diff>
--- a/QLD Housing Vacancy.pptx
+++ b/QLD Housing Vacancy.pptx
@@ -375,7 +375,7 @@
           <a:p>
             <a:fld id="{9184DA70-C731-4C70-880D-CCD4705E623C}" type="datetime1">
               <a:rPr lang="en-US" smtClean="0"/>
-              <a:t>9/19/2022</a:t>
+              <a:t>9/20/2022</a:t>
             </a:fld>
             <a:endParaRPr lang="en-US" dirty="0"/>
           </a:p>
@@ -563,7 +563,7 @@
           <a:p>
             <a:fld id="{4BE1D723-8F53-4F53-90B0-1982A396982E}" type="datetime1">
               <a:rPr lang="en-US" smtClean="0"/>
-              <a:t>9/19/2022</a:t>
+              <a:t>9/20/2022</a:t>
             </a:fld>
             <a:endParaRPr lang="en-US" dirty="0"/>
           </a:p>
@@ -936,7 +936,7 @@
           <a:p>
             <a:fld id="{97669AF7-7BEB-44E4-9852-375E34362B5B}" type="datetime1">
               <a:rPr lang="en-US" smtClean="0"/>
-              <a:t>9/19/2022</a:t>
+              <a:t>9/20/2022</a:t>
             </a:fld>
             <a:endParaRPr lang="en-US" dirty="0"/>
           </a:p>
@@ -1191,7 +1191,7 @@
           <a:p>
             <a:fld id="{BAAAC38D-0552-4C82-B593-E6124DFADBE2}" type="datetime1">
               <a:rPr lang="en-US" smtClean="0"/>
-              <a:t>9/19/2022</a:t>
+              <a:t>9/20/2022</a:t>
             </a:fld>
             <a:endParaRPr lang="en-US" dirty="0"/>
           </a:p>
@@ -1588,7 +1588,7 @@
           <a:p>
             <a:fld id="{D9DF0F1C-5577-4ACB-BB62-DF8F3C494C7E}" type="datetime1">
               <a:rPr lang="en-US" smtClean="0"/>
-              <a:t>9/19/2022</a:t>
+              <a:t>9/20/2022</a:t>
             </a:fld>
             <a:endParaRPr lang="en-US" dirty="0"/>
           </a:p>
@@ -1724,7 +1724,7 @@
           <a:p>
             <a:fld id="{1775B394-D9F9-4F0C-B15D-605F45CB9E9F}" type="datetime1">
               <a:rPr lang="en-US" smtClean="0"/>
-              <a:t>9/19/2022</a:t>
+              <a:t>9/20/2022</a:t>
             </a:fld>
             <a:endParaRPr lang="en-US" dirty="0"/>
           </a:p>
@@ -1881,7 +1881,7 @@
           <a:p>
             <a:fld id="{39667345-2558-425A-8533-9BFDBCE15005}" type="datetime1">
               <a:rPr lang="en-US" smtClean="0"/>
-              <a:t>9/19/2022</a:t>
+              <a:t>9/20/2022</a:t>
             </a:fld>
             <a:endParaRPr lang="en-US" dirty="0"/>
           </a:p>
@@ -2210,7 +2210,7 @@
           <a:p>
             <a:fld id="{92BEA474-078D-4E9B-9B14-09A87B19DC46}" type="datetime1">
               <a:rPr lang="en-US" smtClean="0"/>
-              <a:t>9/19/2022</a:t>
+              <a:t>9/20/2022</a:t>
             </a:fld>
             <a:endParaRPr lang="en-US" dirty="0"/>
           </a:p>
@@ -2560,7 +2560,7 @@
           <a:p>
             <a:fld id="{4907D986-8816-4272-A432-0437A28A9828}" type="datetime1">
               <a:rPr lang="en-US" smtClean="0"/>
-              <a:t>9/19/2022</a:t>
+              <a:t>9/20/2022</a:t>
             </a:fld>
             <a:endParaRPr lang="en-US" dirty="0"/>
           </a:p>
@@ -2821,7 +2821,7 @@
           <a:p>
             <a:fld id="{62D6E202-B606-4609-B914-27C9371A1F6D}" type="datetime1">
               <a:rPr lang="en-US" smtClean="0"/>
-              <a:t>9/19/2022</a:t>
+              <a:t>9/20/2022</a:t>
             </a:fld>
             <a:endParaRPr lang="en-US" dirty="0"/>
           </a:p>
@@ -3995,7 +3995,27 @@
           <a:bodyPr/>
           <a:lstStyle/>
           <a:p>
-            <a:endParaRPr lang="en-AU"/>
+            <a:pPr>
+              <a:buFont typeface="Wingdings" panose="05000000000000000000" pitchFamily="2" charset="2"/>
+              <a:buChar char="q"/>
+            </a:pPr>
+            <a:r>
+              <a:rPr lang="en-AU" dirty="0"/>
+              <a:t> It seems having a trend other than the 5 Bedroom’s average vacancy days.</a:t>
+            </a:r>
+          </a:p>
+          <a:p>
+            <a:endParaRPr lang="en-AU" dirty="0"/>
+          </a:p>
+          <a:p>
+            <a:pPr>
+              <a:buFont typeface="Wingdings" panose="05000000000000000000" pitchFamily="2" charset="2"/>
+              <a:buChar char="q"/>
+            </a:pPr>
+            <a:r>
+              <a:rPr lang="en-AU" dirty="0"/>
+              <a:t> Lets dig deep on 5 Bedroom’s data set.</a:t>
+            </a:r>
           </a:p>
         </p:txBody>
       </p:sp>
@@ -4079,8 +4099,8 @@
         </p:blipFill>
         <p:spPr>
           <a:xfrm>
-            <a:off x="1675089" y="2035028"/>
-            <a:ext cx="8114863" cy="4057432"/>
+            <a:off x="193183" y="1827512"/>
+            <a:ext cx="8114863" cy="4586167"/>
           </a:xfrm>
           <a:prstGeom prst="rect">
             <a:avLst/>
@@ -8138,15 +8158,6 @@
 </file>
 
 <file path=customXml/item1.xml><?xml version="1.0" encoding="utf-8"?>
-<?mso-contentType ?>
-<FormTemplates xmlns="http://schemas.microsoft.com/sharepoint/v3/contenttype/forms">
-  <Display>DocumentLibraryForm</Display>
-  <Edit>DocumentLibraryForm</Edit>
-  <New>DocumentLibraryForm</New>
-</FormTemplates>
-</file>
-
-<file path=customXml/item2.xml><?xml version="1.0" encoding="utf-8"?>
 <ct:contentTypeSchema xmlns:ct="http://schemas.microsoft.com/office/2006/metadata/contentType" xmlns:ma="http://schemas.microsoft.com/office/2006/metadata/properties/metaAttributes" ct:_="" ma:_="" ma:contentTypeName="Document" ma:contentTypeID="0x01010079F111ED35F8CC479449609E8A0923A6" ma:contentTypeVersion="12" ma:contentTypeDescription="Create a new document." ma:contentTypeScope="" ma:versionID="a410dd7f93c95333ffa1b60ed6adedd1">
   <xsd:schema xmlns:xsd="http://www.w3.org/2001/XMLSchema" xmlns:xs="http://www.w3.org/2001/XMLSchema" xmlns:p="http://schemas.microsoft.com/office/2006/metadata/properties" xmlns:ns2="71af3243-3dd4-4a8d-8c0d-dd76da1f02a5" xmlns:ns3="16c05727-aa75-4e4a-9b5f-8a80a1165891" targetNamespace="http://schemas.microsoft.com/office/2006/metadata/properties" ma:root="true" ma:fieldsID="a936d9baba76aa3866493feff160faab" ns2:_="" ns3:_="">
     <xsd:import namespace="71af3243-3dd4-4a8d-8c0d-dd76da1f02a5"/>
@@ -8367,6 +8378,15 @@
 </ct:contentTypeSchema>
 </file>
 
+<file path=customXml/item2.xml><?xml version="1.0" encoding="utf-8"?>
+<?mso-contentType ?>
+<FormTemplates xmlns="http://schemas.microsoft.com/sharepoint/v3/contenttype/forms">
+  <Display>DocumentLibraryForm</Display>
+  <Edit>DocumentLibraryForm</Edit>
+  <New>DocumentLibraryForm</New>
+</FormTemplates>
+</file>
+
 <file path=customXml/item3.xml><?xml version="1.0" encoding="utf-8"?>
 <p:properties xmlns:p="http://schemas.microsoft.com/office/2006/metadata/properties" xmlns:xsi="http://www.w3.org/2001/XMLSchema-instance" xmlns:pc="http://schemas.microsoft.com/office/infopath/2007/PartnerControls">
   <documentManagement>
@@ -8377,14 +8397,6 @@
 </file>
 
 <file path=customXml/itemProps1.xml><?xml version="1.0" encoding="utf-8"?>
-<ds:datastoreItem xmlns:ds="http://schemas.openxmlformats.org/officeDocument/2006/customXml" ds:itemID="{AA3F7EDC-E5B4-4BBC-9D2A-CBE6D46C37AD}">
-  <ds:schemaRefs>
-    <ds:schemaRef ds:uri="http://schemas.microsoft.com/sharepoint/v3/contenttype/forms"/>
-  </ds:schemaRefs>
-</ds:datastoreItem>
-</file>
-
-<file path=customXml/itemProps2.xml><?xml version="1.0" encoding="utf-8"?>
 <ds:datastoreItem xmlns:ds="http://schemas.openxmlformats.org/officeDocument/2006/customXml" ds:itemID="{93932EF5-314F-409E-8020-FEE5FA0795B9}">
   <ds:schemaRefs>
     <ds:schemaRef ds:uri="http://schemas.microsoft.com/office/2006/metadata/contentType"/>
@@ -8403,6 +8415,14 @@
 </ds:datastoreItem>
 </file>
 
+<file path=customXml/itemProps2.xml><?xml version="1.0" encoding="utf-8"?>
+<ds:datastoreItem xmlns:ds="http://schemas.openxmlformats.org/officeDocument/2006/customXml" ds:itemID="{AA3F7EDC-E5B4-4BBC-9D2A-CBE6D46C37AD}">
+  <ds:schemaRefs>
+    <ds:schemaRef ds:uri="http://schemas.microsoft.com/sharepoint/v3/contenttype/forms"/>
+  </ds:schemaRefs>
+</ds:datastoreItem>
+</file>
+
 <file path=customXml/itemProps3.xml><?xml version="1.0" encoding="utf-8"?>
 <ds:datastoreItem xmlns:ds="http://schemas.openxmlformats.org/officeDocument/2006/customXml" ds:itemID="{A03EEFF0-FB57-4CB4-8BFC-DF397689E2ED}">
   <ds:schemaRefs>

</xml_diff>